<commit_message>
weeks 6,7,8: updated slides
</commit_message>
<xml_diff>
--- a/week_06/week_06.pptx
+++ b/week_06/week_06.pptx
@@ -4,6 +4,9 @@
   <p:sldMasterIdLst>
     <p:sldMasterId id="2147483840" r:id="rId1"/>
   </p:sldMasterIdLst>
+  <p:notesMasterIdLst>
+    <p:notesMasterId r:id="rId12"/>
+  </p:notesMasterIdLst>
   <p:sldIdLst>
     <p:sldId id="256" r:id="rId2"/>
     <p:sldId id="258" r:id="rId3"/>
@@ -121,6 +124,356 @@
 </p:presentation>
 </file>
 
+<file path=ppt/notesMasters/notesMaster1.xml><?xml version="1.0" encoding="utf-8"?>
+<p:notesMaster xmlns:a="http://schemas.openxmlformats.org/drawingml/2006/main" xmlns:r="http://schemas.openxmlformats.org/officeDocument/2006/relationships" xmlns:p="http://schemas.openxmlformats.org/presentationml/2006/main">
+  <p:cSld>
+    <p:bg>
+      <p:bgRef idx="1001">
+        <a:schemeClr val="bg1"/>
+      </p:bgRef>
+    </p:bg>
+    <p:spTree>
+      <p:nvGrpSpPr>
+        <p:cNvPr id="1" name=""/>
+        <p:cNvGrpSpPr/>
+        <p:nvPr/>
+      </p:nvGrpSpPr>
+      <p:grpSpPr>
+        <a:xfrm>
+          <a:off x="0" y="0"/>
+          <a:ext cx="0" cy="0"/>
+          <a:chOff x="0" y="0"/>
+          <a:chExt cx="0" cy="0"/>
+        </a:xfrm>
+      </p:grpSpPr>
+      <p:sp>
+        <p:nvSpPr>
+          <p:cNvPr id="2" name="Header Placeholder 1"/>
+          <p:cNvSpPr>
+            <a:spLocks noGrp="1"/>
+          </p:cNvSpPr>
+          <p:nvPr>
+            <p:ph type="hdr" sz="quarter"/>
+          </p:nvPr>
+        </p:nvSpPr>
+        <p:spPr>
+          <a:xfrm>
+            <a:off x="0" y="0"/>
+            <a:ext cx="2971800" cy="458788"/>
+          </a:xfrm>
+          <a:prstGeom prst="rect">
+            <a:avLst/>
+          </a:prstGeom>
+        </p:spPr>
+        <p:txBody>
+          <a:bodyPr vert="horz" lIns="91440" tIns="45720" rIns="91440" bIns="45720" rtlCol="0"/>
+          <a:lstStyle>
+            <a:lvl1pPr algn="l">
+              <a:defRPr sz="1200"/>
+            </a:lvl1pPr>
+          </a:lstStyle>
+          <a:p>
+            <a:endParaRPr lang="en-US"/>
+          </a:p>
+        </p:txBody>
+      </p:sp>
+      <p:sp>
+        <p:nvSpPr>
+          <p:cNvPr id="3" name="Date Placeholder 2"/>
+          <p:cNvSpPr>
+            <a:spLocks noGrp="1"/>
+          </p:cNvSpPr>
+          <p:nvPr>
+            <p:ph type="dt" idx="1"/>
+          </p:nvPr>
+        </p:nvSpPr>
+        <p:spPr>
+          <a:xfrm>
+            <a:off x="3884613" y="0"/>
+            <a:ext cx="2971800" cy="458788"/>
+          </a:xfrm>
+          <a:prstGeom prst="rect">
+            <a:avLst/>
+          </a:prstGeom>
+        </p:spPr>
+        <p:txBody>
+          <a:bodyPr vert="horz" lIns="91440" tIns="45720" rIns="91440" bIns="45720" rtlCol="0"/>
+          <a:lstStyle>
+            <a:lvl1pPr algn="r">
+              <a:defRPr sz="1200"/>
+            </a:lvl1pPr>
+          </a:lstStyle>
+          <a:p>
+            <a:fld id="{733362CA-2579-46DB-9149-99DF8064B76B}" type="datetimeFigureOut">
+              <a:rPr lang="en-US" smtClean="0"/>
+              <a:t>10/3/2016</a:t>
+            </a:fld>
+            <a:endParaRPr lang="en-US"/>
+          </a:p>
+        </p:txBody>
+      </p:sp>
+      <p:sp>
+        <p:nvSpPr>
+          <p:cNvPr id="4" name="Slide Image Placeholder 3"/>
+          <p:cNvSpPr>
+            <a:spLocks noGrp="1" noRot="1" noChangeAspect="1"/>
+          </p:cNvSpPr>
+          <p:nvPr>
+            <p:ph type="sldImg" idx="2"/>
+          </p:nvPr>
+        </p:nvSpPr>
+        <p:spPr>
+          <a:xfrm>
+            <a:off x="685800" y="1143000"/>
+            <a:ext cx="5486400" cy="3086100"/>
+          </a:xfrm>
+          <a:prstGeom prst="rect">
+            <a:avLst/>
+          </a:prstGeom>
+          <a:noFill/>
+          <a:ln w="12700">
+            <a:solidFill>
+              <a:prstClr val="black"/>
+            </a:solidFill>
+          </a:ln>
+        </p:spPr>
+        <p:txBody>
+          <a:bodyPr vert="horz" lIns="91440" tIns="45720" rIns="91440" bIns="45720" rtlCol="0" anchor="ctr"/>
+          <a:lstStyle/>
+          <a:p>
+            <a:endParaRPr lang="en-US"/>
+          </a:p>
+        </p:txBody>
+      </p:sp>
+      <p:sp>
+        <p:nvSpPr>
+          <p:cNvPr id="5" name="Notes Placeholder 4"/>
+          <p:cNvSpPr>
+            <a:spLocks noGrp="1"/>
+          </p:cNvSpPr>
+          <p:nvPr>
+            <p:ph type="body" sz="quarter" idx="3"/>
+          </p:nvPr>
+        </p:nvSpPr>
+        <p:spPr>
+          <a:xfrm>
+            <a:off x="685800" y="4400550"/>
+            <a:ext cx="5486400" cy="3600450"/>
+          </a:xfrm>
+          <a:prstGeom prst="rect">
+            <a:avLst/>
+          </a:prstGeom>
+        </p:spPr>
+        <p:txBody>
+          <a:bodyPr vert="horz" lIns="91440" tIns="45720" rIns="91440" bIns="45720" rtlCol="0"/>
+          <a:lstStyle/>
+          <a:p>
+            <a:pPr lvl="0"/>
+            <a:r>
+              <a:rPr lang="en-US"/>
+              <a:t>Edit Master text styles</a:t>
+            </a:r>
+          </a:p>
+          <a:p>
+            <a:pPr lvl="1"/>
+            <a:r>
+              <a:rPr lang="en-US"/>
+              <a:t>Second level</a:t>
+            </a:r>
+          </a:p>
+          <a:p>
+            <a:pPr lvl="2"/>
+            <a:r>
+              <a:rPr lang="en-US"/>
+              <a:t>Third level</a:t>
+            </a:r>
+          </a:p>
+          <a:p>
+            <a:pPr lvl="3"/>
+            <a:r>
+              <a:rPr lang="en-US"/>
+              <a:t>Fourth level</a:t>
+            </a:r>
+          </a:p>
+          <a:p>
+            <a:pPr lvl="4"/>
+            <a:r>
+              <a:rPr lang="en-US"/>
+              <a:t>Fifth level</a:t>
+            </a:r>
+            <a:endParaRPr lang="en-US"/>
+          </a:p>
+        </p:txBody>
+      </p:sp>
+      <p:sp>
+        <p:nvSpPr>
+          <p:cNvPr id="6" name="Footer Placeholder 5"/>
+          <p:cNvSpPr>
+            <a:spLocks noGrp="1"/>
+          </p:cNvSpPr>
+          <p:nvPr>
+            <p:ph type="ftr" sz="quarter" idx="4"/>
+          </p:nvPr>
+        </p:nvSpPr>
+        <p:spPr>
+          <a:xfrm>
+            <a:off x="0" y="8685213"/>
+            <a:ext cx="2971800" cy="458787"/>
+          </a:xfrm>
+          <a:prstGeom prst="rect">
+            <a:avLst/>
+          </a:prstGeom>
+        </p:spPr>
+        <p:txBody>
+          <a:bodyPr vert="horz" lIns="91440" tIns="45720" rIns="91440" bIns="45720" rtlCol="0" anchor="b"/>
+          <a:lstStyle>
+            <a:lvl1pPr algn="l">
+              <a:defRPr sz="1200"/>
+            </a:lvl1pPr>
+          </a:lstStyle>
+          <a:p>
+            <a:endParaRPr lang="en-US"/>
+          </a:p>
+        </p:txBody>
+      </p:sp>
+      <p:sp>
+        <p:nvSpPr>
+          <p:cNvPr id="7" name="Slide Number Placeholder 6"/>
+          <p:cNvSpPr>
+            <a:spLocks noGrp="1"/>
+          </p:cNvSpPr>
+          <p:nvPr>
+            <p:ph type="sldNum" sz="quarter" idx="5"/>
+          </p:nvPr>
+        </p:nvSpPr>
+        <p:spPr>
+          <a:xfrm>
+            <a:off x="3884613" y="8685213"/>
+            <a:ext cx="2971800" cy="458787"/>
+          </a:xfrm>
+          <a:prstGeom prst="rect">
+            <a:avLst/>
+          </a:prstGeom>
+        </p:spPr>
+        <p:txBody>
+          <a:bodyPr vert="horz" lIns="91440" tIns="45720" rIns="91440" bIns="45720" rtlCol="0" anchor="b"/>
+          <a:lstStyle>
+            <a:lvl1pPr algn="r">
+              <a:defRPr sz="1200"/>
+            </a:lvl1pPr>
+          </a:lstStyle>
+          <a:p>
+            <a:fld id="{F5AFC31E-E835-4BD0-9581-BA0AA35DEEE0}" type="slidenum">
+              <a:rPr lang="en-US" smtClean="0"/>
+              <a:t>‹#›</a:t>
+            </a:fld>
+            <a:endParaRPr lang="en-US"/>
+          </a:p>
+        </p:txBody>
+      </p:sp>
+    </p:spTree>
+    <p:extLst>
+      <p:ext uri="{BB962C8B-B14F-4D97-AF65-F5344CB8AC3E}">
+        <p14:creationId xmlns:p14="http://schemas.microsoft.com/office/powerpoint/2010/main" val="3683351111"/>
+      </p:ext>
+    </p:extLst>
+  </p:cSld>
+  <p:clrMap bg1="lt1" tx1="dk1" bg2="lt2" tx2="dk2" accent1="accent1" accent2="accent2" accent3="accent3" accent4="accent4" accent5="accent5" accent6="accent6" hlink="hlink" folHlink="folHlink"/>
+  <p:notesStyle>
+    <a:lvl1pPr marL="0" algn="l" defTabSz="914400" rtl="0" eaLnBrk="1" latinLnBrk="0" hangingPunct="1">
+      <a:defRPr sz="1200" kern="1200">
+        <a:solidFill>
+          <a:schemeClr val="tx1"/>
+        </a:solidFill>
+        <a:latin typeface="+mn-lt"/>
+        <a:ea typeface="+mn-ea"/>
+        <a:cs typeface="+mn-cs"/>
+      </a:defRPr>
+    </a:lvl1pPr>
+    <a:lvl2pPr marL="457200" algn="l" defTabSz="914400" rtl="0" eaLnBrk="1" latinLnBrk="0" hangingPunct="1">
+      <a:defRPr sz="1200" kern="1200">
+        <a:solidFill>
+          <a:schemeClr val="tx1"/>
+        </a:solidFill>
+        <a:latin typeface="+mn-lt"/>
+        <a:ea typeface="+mn-ea"/>
+        <a:cs typeface="+mn-cs"/>
+      </a:defRPr>
+    </a:lvl2pPr>
+    <a:lvl3pPr marL="914400" algn="l" defTabSz="914400" rtl="0" eaLnBrk="1" latinLnBrk="0" hangingPunct="1">
+      <a:defRPr sz="1200" kern="1200">
+        <a:solidFill>
+          <a:schemeClr val="tx1"/>
+        </a:solidFill>
+        <a:latin typeface="+mn-lt"/>
+        <a:ea typeface="+mn-ea"/>
+        <a:cs typeface="+mn-cs"/>
+      </a:defRPr>
+    </a:lvl3pPr>
+    <a:lvl4pPr marL="1371600" algn="l" defTabSz="914400" rtl="0" eaLnBrk="1" latinLnBrk="0" hangingPunct="1">
+      <a:defRPr sz="1200" kern="1200">
+        <a:solidFill>
+          <a:schemeClr val="tx1"/>
+        </a:solidFill>
+        <a:latin typeface="+mn-lt"/>
+        <a:ea typeface="+mn-ea"/>
+        <a:cs typeface="+mn-cs"/>
+      </a:defRPr>
+    </a:lvl4pPr>
+    <a:lvl5pPr marL="1828800" algn="l" defTabSz="914400" rtl="0" eaLnBrk="1" latinLnBrk="0" hangingPunct="1">
+      <a:defRPr sz="1200" kern="1200">
+        <a:solidFill>
+          <a:schemeClr val="tx1"/>
+        </a:solidFill>
+        <a:latin typeface="+mn-lt"/>
+        <a:ea typeface="+mn-ea"/>
+        <a:cs typeface="+mn-cs"/>
+      </a:defRPr>
+    </a:lvl5pPr>
+    <a:lvl6pPr marL="2286000" algn="l" defTabSz="914400" rtl="0" eaLnBrk="1" latinLnBrk="0" hangingPunct="1">
+      <a:defRPr sz="1200" kern="1200">
+        <a:solidFill>
+          <a:schemeClr val="tx1"/>
+        </a:solidFill>
+        <a:latin typeface="+mn-lt"/>
+        <a:ea typeface="+mn-ea"/>
+        <a:cs typeface="+mn-cs"/>
+      </a:defRPr>
+    </a:lvl6pPr>
+    <a:lvl7pPr marL="2743200" algn="l" defTabSz="914400" rtl="0" eaLnBrk="1" latinLnBrk="0" hangingPunct="1">
+      <a:defRPr sz="1200" kern="1200">
+        <a:solidFill>
+          <a:schemeClr val="tx1"/>
+        </a:solidFill>
+        <a:latin typeface="+mn-lt"/>
+        <a:ea typeface="+mn-ea"/>
+        <a:cs typeface="+mn-cs"/>
+      </a:defRPr>
+    </a:lvl7pPr>
+    <a:lvl8pPr marL="3200400" algn="l" defTabSz="914400" rtl="0" eaLnBrk="1" latinLnBrk="0" hangingPunct="1">
+      <a:defRPr sz="1200" kern="1200">
+        <a:solidFill>
+          <a:schemeClr val="tx1"/>
+        </a:solidFill>
+        <a:latin typeface="+mn-lt"/>
+        <a:ea typeface="+mn-ea"/>
+        <a:cs typeface="+mn-cs"/>
+      </a:defRPr>
+    </a:lvl8pPr>
+    <a:lvl9pPr marL="3657600" algn="l" defTabSz="914400" rtl="0" eaLnBrk="1" latinLnBrk="0" hangingPunct="1">
+      <a:defRPr sz="1200" kern="1200">
+        <a:solidFill>
+          <a:schemeClr val="tx1"/>
+        </a:solidFill>
+        <a:latin typeface="+mn-lt"/>
+        <a:ea typeface="+mn-ea"/>
+        <a:cs typeface="+mn-cs"/>
+      </a:defRPr>
+    </a:lvl9pPr>
+  </p:notesStyle>
+</p:notesMaster>
+</file>
+
 <file path=ppt/slideLayouts/slideLayout1.xml><?xml version="1.0" encoding="utf-8"?>
 <p:sldLayout xmlns:a="http://schemas.openxmlformats.org/drawingml/2006/main" xmlns:r="http://schemas.openxmlformats.org/officeDocument/2006/relationships" xmlns:p="http://schemas.openxmlformats.org/presentationml/2006/main" showMasterSp="0" type="title" preserve="1">
   <p:cSld name="Title Slide">
@@ -182,7 +535,7 @@
           </a:lstStyle>
           <a:p>
             <a:r>
-              <a:rPr lang="en-US" smtClean="0"/>
+              <a:rPr lang="en-US"/>
               <a:t>Click to edit Master title style</a:t>
             </a:r>
             <a:endParaRPr lang="en-US" dirty="0"/>
@@ -255,7 +608,7 @@
           </a:lstStyle>
           <a:p>
             <a:r>
-              <a:rPr lang="en-US" smtClean="0"/>
+              <a:rPr lang="en-US"/>
               <a:t>Click to edit Master subtitle style</a:t>
             </a:r>
             <a:endParaRPr lang="en-US" dirty="0"/>
@@ -287,9 +640,9 @@
             </a:lvl1pPr>
           </a:lstStyle>
           <a:p>
-            <a:fld id="{9E016143-E03C-4CFD-AFDC-14E5BDEA754C}" type="datetimeFigureOut">
-              <a:rPr lang="en-US" dirty="0"/>
-              <a:t>2/24/2016</a:t>
+            <a:fld id="{CAE2E5AA-CCA8-41A6-91F2-8DFF7A19E02E}" type="datetime1">
+              <a:rPr lang="en-US" smtClean="0"/>
+              <a:t>10/3/2016</a:t>
             </a:fld>
             <a:endParaRPr lang="en-US" dirty="0"/>
           </a:p>
@@ -437,83 +790,83 @@
           <a:lstStyle/>
           <a:p>
             <a:r>
+              <a:rPr lang="en-US"/>
+              <a:t>Click to edit Master title style</a:t>
+            </a:r>
+            <a:endParaRPr lang="en-US" dirty="0"/>
+          </a:p>
+        </p:txBody>
+      </p:sp>
+      <p:sp>
+        <p:nvSpPr>
+          <p:cNvPr id="3" name="Vertical Text Placeholder 2"/>
+          <p:cNvSpPr>
+            <a:spLocks noGrp="1"/>
+          </p:cNvSpPr>
+          <p:nvPr>
+            <p:ph type="body" orient="vert" idx="1"/>
+          </p:nvPr>
+        </p:nvSpPr>
+        <p:spPr/>
+        <p:txBody>
+          <a:bodyPr vert="eaVert"/>
+          <a:lstStyle/>
+          <a:p>
+            <a:pPr lvl="0"/>
+            <a:r>
+              <a:rPr lang="en-US"/>
+              <a:t>Click to edit Master text styles</a:t>
+            </a:r>
+          </a:p>
+          <a:p>
+            <a:pPr lvl="1"/>
+            <a:r>
+              <a:rPr lang="en-US"/>
+              <a:t>Second level</a:t>
+            </a:r>
+          </a:p>
+          <a:p>
+            <a:pPr lvl="2"/>
+            <a:r>
+              <a:rPr lang="en-US"/>
+              <a:t>Third level</a:t>
+            </a:r>
+          </a:p>
+          <a:p>
+            <a:pPr lvl="3"/>
+            <a:r>
+              <a:rPr lang="en-US"/>
+              <a:t>Fourth level</a:t>
+            </a:r>
+          </a:p>
+          <a:p>
+            <a:pPr lvl="4"/>
+            <a:r>
+              <a:rPr lang="en-US"/>
+              <a:t>Fifth level</a:t>
+            </a:r>
+            <a:endParaRPr lang="en-US" dirty="0"/>
+          </a:p>
+        </p:txBody>
+      </p:sp>
+      <p:sp>
+        <p:nvSpPr>
+          <p:cNvPr id="4" name="Date Placeholder 3"/>
+          <p:cNvSpPr>
+            <a:spLocks noGrp="1"/>
+          </p:cNvSpPr>
+          <p:nvPr>
+            <p:ph type="dt" sz="half" idx="10"/>
+          </p:nvPr>
+        </p:nvSpPr>
+        <p:spPr/>
+        <p:txBody>
+          <a:bodyPr/>
+          <a:lstStyle/>
+          <a:p>
+            <a:fld id="{60FD48B7-988E-4881-AC34-80B3E987C8B0}" type="datetime1">
               <a:rPr lang="en-US" smtClean="0"/>
-              <a:t>Click to edit Master title style</a:t>
-            </a:r>
-            <a:endParaRPr lang="en-US" dirty="0"/>
-          </a:p>
-        </p:txBody>
-      </p:sp>
-      <p:sp>
-        <p:nvSpPr>
-          <p:cNvPr id="3" name="Vertical Text Placeholder 2"/>
-          <p:cNvSpPr>
-            <a:spLocks noGrp="1"/>
-          </p:cNvSpPr>
-          <p:nvPr>
-            <p:ph type="body" orient="vert" idx="1"/>
-          </p:nvPr>
-        </p:nvSpPr>
-        <p:spPr/>
-        <p:txBody>
-          <a:bodyPr vert="eaVert"/>
-          <a:lstStyle/>
-          <a:p>
-            <a:pPr lvl="0"/>
-            <a:r>
-              <a:rPr lang="en-US" smtClean="0"/>
-              <a:t>Click to edit Master text styles</a:t>
-            </a:r>
-          </a:p>
-          <a:p>
-            <a:pPr lvl="1"/>
-            <a:r>
-              <a:rPr lang="en-US" smtClean="0"/>
-              <a:t>Second level</a:t>
-            </a:r>
-          </a:p>
-          <a:p>
-            <a:pPr lvl="2"/>
-            <a:r>
-              <a:rPr lang="en-US" smtClean="0"/>
-              <a:t>Third level</a:t>
-            </a:r>
-          </a:p>
-          <a:p>
-            <a:pPr lvl="3"/>
-            <a:r>
-              <a:rPr lang="en-US" smtClean="0"/>
-              <a:t>Fourth level</a:t>
-            </a:r>
-          </a:p>
-          <a:p>
-            <a:pPr lvl="4"/>
-            <a:r>
-              <a:rPr lang="en-US" smtClean="0"/>
-              <a:t>Fifth level</a:t>
-            </a:r>
-            <a:endParaRPr lang="en-US" dirty="0"/>
-          </a:p>
-        </p:txBody>
-      </p:sp>
-      <p:sp>
-        <p:nvSpPr>
-          <p:cNvPr id="4" name="Date Placeholder 3"/>
-          <p:cNvSpPr>
-            <a:spLocks noGrp="1"/>
-          </p:cNvSpPr>
-          <p:nvPr>
-            <p:ph type="dt" sz="half" idx="10"/>
-          </p:nvPr>
-        </p:nvSpPr>
-        <p:spPr/>
-        <p:txBody>
-          <a:bodyPr/>
-          <a:lstStyle/>
-          <a:p>
-            <a:fld id="{C033E54A-A8CA-48C1-9504-691B58049D29}" type="datetimeFigureOut">
-              <a:rPr lang="en-US" dirty="0"/>
-              <a:t>2/24/2016</a:t>
+              <a:t>10/3/2016</a:t>
             </a:fld>
             <a:endParaRPr lang="en-US" dirty="0"/>
           </a:p>
@@ -607,7 +960,7 @@
           <a:lstStyle/>
           <a:p>
             <a:r>
-              <a:rPr lang="en-US" smtClean="0"/>
+              <a:rPr lang="en-US"/>
               <a:t>Click to edit Master title style</a:t>
             </a:r>
             <a:endParaRPr lang="en-US" dirty="0"/>
@@ -636,59 +989,59 @@
           <a:p>
             <a:pPr lvl="0"/>
             <a:r>
+              <a:rPr lang="en-US"/>
+              <a:t>Click to edit Master text styles</a:t>
+            </a:r>
+          </a:p>
+          <a:p>
+            <a:pPr lvl="1"/>
+            <a:r>
+              <a:rPr lang="en-US"/>
+              <a:t>Second level</a:t>
+            </a:r>
+          </a:p>
+          <a:p>
+            <a:pPr lvl="2"/>
+            <a:r>
+              <a:rPr lang="en-US"/>
+              <a:t>Third level</a:t>
+            </a:r>
+          </a:p>
+          <a:p>
+            <a:pPr lvl="3"/>
+            <a:r>
+              <a:rPr lang="en-US"/>
+              <a:t>Fourth level</a:t>
+            </a:r>
+          </a:p>
+          <a:p>
+            <a:pPr lvl="4"/>
+            <a:r>
+              <a:rPr lang="en-US"/>
+              <a:t>Fifth level</a:t>
+            </a:r>
+            <a:endParaRPr lang="en-US" dirty="0"/>
+          </a:p>
+        </p:txBody>
+      </p:sp>
+      <p:sp>
+        <p:nvSpPr>
+          <p:cNvPr id="4" name="Date Placeholder 3"/>
+          <p:cNvSpPr>
+            <a:spLocks noGrp="1"/>
+          </p:cNvSpPr>
+          <p:nvPr>
+            <p:ph type="dt" sz="half" idx="10"/>
+          </p:nvPr>
+        </p:nvSpPr>
+        <p:spPr/>
+        <p:txBody>
+          <a:bodyPr/>
+          <a:lstStyle/>
+          <a:p>
+            <a:fld id="{B0AB903E-A133-46AC-8C85-F6F33A212415}" type="datetime1">
               <a:rPr lang="en-US" smtClean="0"/>
-              <a:t>Click to edit Master text styles</a:t>
-            </a:r>
-          </a:p>
-          <a:p>
-            <a:pPr lvl="1"/>
-            <a:r>
-              <a:rPr lang="en-US" smtClean="0"/>
-              <a:t>Second level</a:t>
-            </a:r>
-          </a:p>
-          <a:p>
-            <a:pPr lvl="2"/>
-            <a:r>
-              <a:rPr lang="en-US" smtClean="0"/>
-              <a:t>Third level</a:t>
-            </a:r>
-          </a:p>
-          <a:p>
-            <a:pPr lvl="3"/>
-            <a:r>
-              <a:rPr lang="en-US" smtClean="0"/>
-              <a:t>Fourth level</a:t>
-            </a:r>
-          </a:p>
-          <a:p>
-            <a:pPr lvl="4"/>
-            <a:r>
-              <a:rPr lang="en-US" smtClean="0"/>
-              <a:t>Fifth level</a:t>
-            </a:r>
-            <a:endParaRPr lang="en-US" dirty="0"/>
-          </a:p>
-        </p:txBody>
-      </p:sp>
-      <p:sp>
-        <p:nvSpPr>
-          <p:cNvPr id="4" name="Date Placeholder 3"/>
-          <p:cNvSpPr>
-            <a:spLocks noGrp="1"/>
-          </p:cNvSpPr>
-          <p:nvPr>
-            <p:ph type="dt" sz="half" idx="10"/>
-          </p:nvPr>
-        </p:nvSpPr>
-        <p:spPr/>
-        <p:txBody>
-          <a:bodyPr/>
-          <a:lstStyle/>
-          <a:p>
-            <a:fld id="{B5F6C806-BBF7-471C-9527-881CE2266695}" type="datetimeFigureOut">
-              <a:rPr lang="en-US" dirty="0"/>
-              <a:t>2/24/2016</a:t>
+              <a:t>10/3/2016</a:t>
             </a:fld>
             <a:endParaRPr lang="en-US" dirty="0"/>
           </a:p>
@@ -777,83 +1130,83 @@
           <a:lstStyle/>
           <a:p>
             <a:r>
+              <a:rPr lang="en-US"/>
+              <a:t>Click to edit Master title style</a:t>
+            </a:r>
+            <a:endParaRPr lang="en-US" dirty="0"/>
+          </a:p>
+        </p:txBody>
+      </p:sp>
+      <p:sp>
+        <p:nvSpPr>
+          <p:cNvPr id="3" name="Content Placeholder 2"/>
+          <p:cNvSpPr>
+            <a:spLocks noGrp="1"/>
+          </p:cNvSpPr>
+          <p:nvPr>
+            <p:ph idx="1"/>
+          </p:nvPr>
+        </p:nvSpPr>
+        <p:spPr/>
+        <p:txBody>
+          <a:bodyPr/>
+          <a:lstStyle/>
+          <a:p>
+            <a:pPr lvl="0"/>
+            <a:r>
+              <a:rPr lang="en-US"/>
+              <a:t>Click to edit Master text styles</a:t>
+            </a:r>
+          </a:p>
+          <a:p>
+            <a:pPr lvl="1"/>
+            <a:r>
+              <a:rPr lang="en-US"/>
+              <a:t>Second level</a:t>
+            </a:r>
+          </a:p>
+          <a:p>
+            <a:pPr lvl="2"/>
+            <a:r>
+              <a:rPr lang="en-US"/>
+              <a:t>Third level</a:t>
+            </a:r>
+          </a:p>
+          <a:p>
+            <a:pPr lvl="3"/>
+            <a:r>
+              <a:rPr lang="en-US"/>
+              <a:t>Fourth level</a:t>
+            </a:r>
+          </a:p>
+          <a:p>
+            <a:pPr lvl="4"/>
+            <a:r>
+              <a:rPr lang="en-US"/>
+              <a:t>Fifth level</a:t>
+            </a:r>
+            <a:endParaRPr lang="en-US" dirty="0"/>
+          </a:p>
+        </p:txBody>
+      </p:sp>
+      <p:sp>
+        <p:nvSpPr>
+          <p:cNvPr id="4" name="Date Placeholder 3"/>
+          <p:cNvSpPr>
+            <a:spLocks noGrp="1"/>
+          </p:cNvSpPr>
+          <p:nvPr>
+            <p:ph type="dt" sz="half" idx="10"/>
+          </p:nvPr>
+        </p:nvSpPr>
+        <p:spPr/>
+        <p:txBody>
+          <a:bodyPr/>
+          <a:lstStyle/>
+          <a:p>
+            <a:fld id="{D7097D4F-4730-40D1-A533-A8AFC1265702}" type="datetime1">
               <a:rPr lang="en-US" smtClean="0"/>
-              <a:t>Click to edit Master title style</a:t>
-            </a:r>
-            <a:endParaRPr lang="en-US" dirty="0"/>
-          </a:p>
-        </p:txBody>
-      </p:sp>
-      <p:sp>
-        <p:nvSpPr>
-          <p:cNvPr id="3" name="Content Placeholder 2"/>
-          <p:cNvSpPr>
-            <a:spLocks noGrp="1"/>
-          </p:cNvSpPr>
-          <p:nvPr>
-            <p:ph idx="1"/>
-          </p:nvPr>
-        </p:nvSpPr>
-        <p:spPr/>
-        <p:txBody>
-          <a:bodyPr/>
-          <a:lstStyle/>
-          <a:p>
-            <a:pPr lvl="0"/>
-            <a:r>
-              <a:rPr lang="en-US" smtClean="0"/>
-              <a:t>Click to edit Master text styles</a:t>
-            </a:r>
-          </a:p>
-          <a:p>
-            <a:pPr lvl="1"/>
-            <a:r>
-              <a:rPr lang="en-US" smtClean="0"/>
-              <a:t>Second level</a:t>
-            </a:r>
-          </a:p>
-          <a:p>
-            <a:pPr lvl="2"/>
-            <a:r>
-              <a:rPr lang="en-US" smtClean="0"/>
-              <a:t>Third level</a:t>
-            </a:r>
-          </a:p>
-          <a:p>
-            <a:pPr lvl="3"/>
-            <a:r>
-              <a:rPr lang="en-US" smtClean="0"/>
-              <a:t>Fourth level</a:t>
-            </a:r>
-          </a:p>
-          <a:p>
-            <a:pPr lvl="4"/>
-            <a:r>
-              <a:rPr lang="en-US" smtClean="0"/>
-              <a:t>Fifth level</a:t>
-            </a:r>
-            <a:endParaRPr lang="en-US" dirty="0"/>
-          </a:p>
-        </p:txBody>
-      </p:sp>
-      <p:sp>
-        <p:nvSpPr>
-          <p:cNvPr id="4" name="Date Placeholder 3"/>
-          <p:cNvSpPr>
-            <a:spLocks noGrp="1"/>
-          </p:cNvSpPr>
-          <p:nvPr>
-            <p:ph type="dt" sz="half" idx="10"/>
-          </p:nvPr>
-        </p:nvSpPr>
-        <p:spPr/>
-        <p:txBody>
-          <a:bodyPr/>
-          <a:lstStyle/>
-          <a:p>
-            <a:fld id="{78C94063-DF36-4330-A365-08DA1FA5B7D6}" type="datetimeFigureOut">
-              <a:rPr lang="en-US" dirty="0"/>
-              <a:t>2/24/2016</a:t>
+              <a:t>10/3/2016</a:t>
             </a:fld>
             <a:endParaRPr lang="en-US" dirty="0"/>
           </a:p>
@@ -956,7 +1309,7 @@
           </a:lstStyle>
           <a:p>
             <a:r>
-              <a:rPr lang="en-US" smtClean="0"/>
+              <a:rPr lang="en-US"/>
               <a:t>Click to edit Master title style</a:t>
             </a:r>
             <a:endParaRPr lang="en-US" dirty="0"/>
@@ -1079,30 +1432,30 @@
           <a:p>
             <a:pPr lvl="0"/>
             <a:r>
+              <a:rPr lang="en-US"/>
+              <a:t>Click to edit Master text styles</a:t>
+            </a:r>
+          </a:p>
+        </p:txBody>
+      </p:sp>
+      <p:sp>
+        <p:nvSpPr>
+          <p:cNvPr id="4" name="Date Placeholder 3"/>
+          <p:cNvSpPr>
+            <a:spLocks noGrp="1"/>
+          </p:cNvSpPr>
+          <p:nvPr>
+            <p:ph type="dt" sz="half" idx="10"/>
+          </p:nvPr>
+        </p:nvSpPr>
+        <p:spPr/>
+        <p:txBody>
+          <a:bodyPr/>
+          <a:lstStyle/>
+          <a:p>
+            <a:fld id="{B6B5BDEE-36A3-4CFB-9BD1-934B26D1D10C}" type="datetime1">
               <a:rPr lang="en-US" smtClean="0"/>
-              <a:t>Click to edit Master text styles</a:t>
-            </a:r>
-          </a:p>
-        </p:txBody>
-      </p:sp>
-      <p:sp>
-        <p:nvSpPr>
-          <p:cNvPr id="4" name="Date Placeholder 3"/>
-          <p:cNvSpPr>
-            <a:spLocks noGrp="1"/>
-          </p:cNvSpPr>
-          <p:nvPr>
-            <p:ph type="dt" sz="half" idx="10"/>
-          </p:nvPr>
-        </p:nvSpPr>
-        <p:spPr/>
-        <p:txBody>
-          <a:bodyPr/>
-          <a:lstStyle/>
-          <a:p>
-            <a:fld id="{908A7C6C-0F39-4D70-8E8D-FE5B9C95FA73}" type="datetimeFigureOut">
-              <a:rPr lang="en-US" dirty="0"/>
-              <a:t>2/24/2016</a:t>
+              <a:t>10/3/2016</a:t>
             </a:fld>
             <a:endParaRPr lang="en-US" dirty="0"/>
           </a:p>
@@ -1229,7 +1582,7 @@
           <a:lstStyle/>
           <a:p>
             <a:r>
-              <a:rPr lang="en-US" smtClean="0"/>
+              <a:rPr lang="en-US"/>
               <a:t>Click to edit Master title style</a:t>
             </a:r>
             <a:endParaRPr lang="en-US" dirty="0"/>
@@ -1286,35 +1639,35 @@
           <a:p>
             <a:pPr lvl="0"/>
             <a:r>
-              <a:rPr lang="en-US" smtClean="0"/>
+              <a:rPr lang="en-US"/>
               <a:t>Click to edit Master text styles</a:t>
             </a:r>
           </a:p>
           <a:p>
             <a:pPr lvl="1"/>
             <a:r>
-              <a:rPr lang="en-US" smtClean="0"/>
+              <a:rPr lang="en-US"/>
               <a:t>Second level</a:t>
             </a:r>
           </a:p>
           <a:p>
             <a:pPr lvl="2"/>
             <a:r>
-              <a:rPr lang="en-US" smtClean="0"/>
+              <a:rPr lang="en-US"/>
               <a:t>Third level</a:t>
             </a:r>
           </a:p>
           <a:p>
             <a:pPr lvl="3"/>
             <a:r>
-              <a:rPr lang="en-US" smtClean="0"/>
+              <a:rPr lang="en-US"/>
               <a:t>Fourth level</a:t>
             </a:r>
           </a:p>
           <a:p>
             <a:pPr lvl="4"/>
             <a:r>
-              <a:rPr lang="en-US" smtClean="0"/>
+              <a:rPr lang="en-US"/>
               <a:t>Fifth level</a:t>
             </a:r>
             <a:endParaRPr lang="en-US" dirty="0"/>
@@ -1371,59 +1724,59 @@
           <a:p>
             <a:pPr lvl="0"/>
             <a:r>
+              <a:rPr lang="en-US"/>
+              <a:t>Click to edit Master text styles</a:t>
+            </a:r>
+          </a:p>
+          <a:p>
+            <a:pPr lvl="1"/>
+            <a:r>
+              <a:rPr lang="en-US"/>
+              <a:t>Second level</a:t>
+            </a:r>
+          </a:p>
+          <a:p>
+            <a:pPr lvl="2"/>
+            <a:r>
+              <a:rPr lang="en-US"/>
+              <a:t>Third level</a:t>
+            </a:r>
+          </a:p>
+          <a:p>
+            <a:pPr lvl="3"/>
+            <a:r>
+              <a:rPr lang="en-US"/>
+              <a:t>Fourth level</a:t>
+            </a:r>
+          </a:p>
+          <a:p>
+            <a:pPr lvl="4"/>
+            <a:r>
+              <a:rPr lang="en-US"/>
+              <a:t>Fifth level</a:t>
+            </a:r>
+            <a:endParaRPr lang="en-US" dirty="0"/>
+          </a:p>
+        </p:txBody>
+      </p:sp>
+      <p:sp>
+        <p:nvSpPr>
+          <p:cNvPr id="5" name="Date Placeholder 4"/>
+          <p:cNvSpPr>
+            <a:spLocks noGrp="1"/>
+          </p:cNvSpPr>
+          <p:nvPr>
+            <p:ph type="dt" sz="half" idx="10"/>
+          </p:nvPr>
+        </p:nvSpPr>
+        <p:spPr/>
+        <p:txBody>
+          <a:bodyPr/>
+          <a:lstStyle/>
+          <a:p>
+            <a:fld id="{73325E52-8897-411D-8EB4-1AD9766AB33F}" type="datetime1">
               <a:rPr lang="en-US" smtClean="0"/>
-              <a:t>Click to edit Master text styles</a:t>
-            </a:r>
-          </a:p>
-          <a:p>
-            <a:pPr lvl="1"/>
-            <a:r>
-              <a:rPr lang="en-US" smtClean="0"/>
-              <a:t>Second level</a:t>
-            </a:r>
-          </a:p>
-          <a:p>
-            <a:pPr lvl="2"/>
-            <a:r>
-              <a:rPr lang="en-US" smtClean="0"/>
-              <a:t>Third level</a:t>
-            </a:r>
-          </a:p>
-          <a:p>
-            <a:pPr lvl="3"/>
-            <a:r>
-              <a:rPr lang="en-US" smtClean="0"/>
-              <a:t>Fourth level</a:t>
-            </a:r>
-          </a:p>
-          <a:p>
-            <a:pPr lvl="4"/>
-            <a:r>
-              <a:rPr lang="en-US" smtClean="0"/>
-              <a:t>Fifth level</a:t>
-            </a:r>
-            <a:endParaRPr lang="en-US" dirty="0"/>
-          </a:p>
-        </p:txBody>
-      </p:sp>
-      <p:sp>
-        <p:nvSpPr>
-          <p:cNvPr id="5" name="Date Placeholder 4"/>
-          <p:cNvSpPr>
-            <a:spLocks noGrp="1"/>
-          </p:cNvSpPr>
-          <p:nvPr>
-            <p:ph type="dt" sz="half" idx="10"/>
-          </p:nvPr>
-        </p:nvSpPr>
-        <p:spPr/>
-        <p:txBody>
-          <a:bodyPr/>
-          <a:lstStyle/>
-          <a:p>
-            <a:fld id="{DFCFA4AC-08CC-42CE-BD01-C191750A04EC}" type="datetimeFigureOut">
-              <a:rPr lang="en-US" dirty="0"/>
-              <a:t>2/24/2016</a:t>
+              <a:t>10/3/2016</a:t>
             </a:fld>
             <a:endParaRPr lang="en-US" dirty="0"/>
           </a:p>
@@ -1512,7 +1865,7 @@
           <a:lstStyle/>
           <a:p>
             <a:r>
-              <a:rPr lang="en-US" smtClean="0"/>
+              <a:rPr lang="en-US"/>
               <a:t>Click to edit Master title style</a:t>
             </a:r>
             <a:endParaRPr lang="en-US" dirty="0"/>
@@ -1587,7 +1940,7 @@
           <a:p>
             <a:pPr lvl="0"/>
             <a:r>
-              <a:rPr lang="en-US" smtClean="0"/>
+              <a:rPr lang="en-US"/>
               <a:t>Click to edit Master text styles</a:t>
             </a:r>
           </a:p>
@@ -1643,35 +1996,35 @@
           <a:p>
             <a:pPr lvl="0"/>
             <a:r>
-              <a:rPr lang="en-US" smtClean="0"/>
+              <a:rPr lang="en-US"/>
               <a:t>Click to edit Master text styles</a:t>
             </a:r>
           </a:p>
           <a:p>
             <a:pPr lvl="1"/>
             <a:r>
-              <a:rPr lang="en-US" smtClean="0"/>
+              <a:rPr lang="en-US"/>
               <a:t>Second level</a:t>
             </a:r>
           </a:p>
           <a:p>
             <a:pPr lvl="2"/>
             <a:r>
-              <a:rPr lang="en-US" smtClean="0"/>
+              <a:rPr lang="en-US"/>
               <a:t>Third level</a:t>
             </a:r>
           </a:p>
           <a:p>
             <a:pPr lvl="3"/>
             <a:r>
-              <a:rPr lang="en-US" smtClean="0"/>
+              <a:rPr lang="en-US"/>
               <a:t>Fourth level</a:t>
             </a:r>
           </a:p>
           <a:p>
             <a:pPr lvl="4"/>
             <a:r>
-              <a:rPr lang="en-US" smtClean="0"/>
+              <a:rPr lang="en-US"/>
               <a:t>Fifth level</a:t>
             </a:r>
             <a:endParaRPr lang="en-US" dirty="0"/>
@@ -1761,7 +2114,7 @@
               <a:buNone/>
             </a:pPr>
             <a:r>
-              <a:rPr lang="en-US" smtClean="0"/>
+              <a:rPr lang="en-US"/>
               <a:t>Click to edit Master text styles</a:t>
             </a:r>
           </a:p>
@@ -1817,59 +2170,59 @@
           <a:p>
             <a:pPr lvl="0"/>
             <a:r>
+              <a:rPr lang="en-US"/>
+              <a:t>Click to edit Master text styles</a:t>
+            </a:r>
+          </a:p>
+          <a:p>
+            <a:pPr lvl="1"/>
+            <a:r>
+              <a:rPr lang="en-US"/>
+              <a:t>Second level</a:t>
+            </a:r>
+          </a:p>
+          <a:p>
+            <a:pPr lvl="2"/>
+            <a:r>
+              <a:rPr lang="en-US"/>
+              <a:t>Third level</a:t>
+            </a:r>
+          </a:p>
+          <a:p>
+            <a:pPr lvl="3"/>
+            <a:r>
+              <a:rPr lang="en-US"/>
+              <a:t>Fourth level</a:t>
+            </a:r>
+          </a:p>
+          <a:p>
+            <a:pPr lvl="4"/>
+            <a:r>
+              <a:rPr lang="en-US"/>
+              <a:t>Fifth level</a:t>
+            </a:r>
+            <a:endParaRPr lang="en-US" dirty="0"/>
+          </a:p>
+        </p:txBody>
+      </p:sp>
+      <p:sp>
+        <p:nvSpPr>
+          <p:cNvPr id="7" name="Date Placeholder 6"/>
+          <p:cNvSpPr>
+            <a:spLocks noGrp="1"/>
+          </p:cNvSpPr>
+          <p:nvPr>
+            <p:ph type="dt" sz="half" idx="10"/>
+          </p:nvPr>
+        </p:nvSpPr>
+        <p:spPr/>
+        <p:txBody>
+          <a:bodyPr/>
+          <a:lstStyle/>
+          <a:p>
+            <a:fld id="{B2B05853-0DA6-4BFB-BA08-F8E14C0FC247}" type="datetime1">
               <a:rPr lang="en-US" smtClean="0"/>
-              <a:t>Click to edit Master text styles</a:t>
-            </a:r>
-          </a:p>
-          <a:p>
-            <a:pPr lvl="1"/>
-            <a:r>
-              <a:rPr lang="en-US" smtClean="0"/>
-              <a:t>Second level</a:t>
-            </a:r>
-          </a:p>
-          <a:p>
-            <a:pPr lvl="2"/>
-            <a:r>
-              <a:rPr lang="en-US" smtClean="0"/>
-              <a:t>Third level</a:t>
-            </a:r>
-          </a:p>
-          <a:p>
-            <a:pPr lvl="3"/>
-            <a:r>
-              <a:rPr lang="en-US" smtClean="0"/>
-              <a:t>Fourth level</a:t>
-            </a:r>
-          </a:p>
-          <a:p>
-            <a:pPr lvl="4"/>
-            <a:r>
-              <a:rPr lang="en-US" smtClean="0"/>
-              <a:t>Fifth level</a:t>
-            </a:r>
-            <a:endParaRPr lang="en-US" dirty="0"/>
-          </a:p>
-        </p:txBody>
-      </p:sp>
-      <p:sp>
-        <p:nvSpPr>
-          <p:cNvPr id="7" name="Date Placeholder 6"/>
-          <p:cNvSpPr>
-            <a:spLocks noGrp="1"/>
-          </p:cNvSpPr>
-          <p:nvPr>
-            <p:ph type="dt" sz="half" idx="10"/>
-          </p:nvPr>
-        </p:nvSpPr>
-        <p:spPr/>
-        <p:txBody>
-          <a:bodyPr/>
-          <a:lstStyle/>
-          <a:p>
-            <a:fld id="{1BA7A723-92A7-435B-B681-F25B092FEFEB}" type="datetimeFigureOut">
-              <a:rPr lang="en-US" dirty="0"/>
-              <a:t>2/24/2016</a:t>
+              <a:t>10/3/2016</a:t>
             </a:fld>
             <a:endParaRPr lang="en-US" dirty="0"/>
           </a:p>
@@ -1958,31 +2311,31 @@
           <a:lstStyle/>
           <a:p>
             <a:r>
+              <a:rPr lang="en-US"/>
+              <a:t>Click to edit Master title style</a:t>
+            </a:r>
+            <a:endParaRPr lang="en-US" dirty="0"/>
+          </a:p>
+        </p:txBody>
+      </p:sp>
+      <p:sp>
+        <p:nvSpPr>
+          <p:cNvPr id="3" name="Date Placeholder 2"/>
+          <p:cNvSpPr>
+            <a:spLocks noGrp="1"/>
+          </p:cNvSpPr>
+          <p:nvPr>
+            <p:ph type="dt" sz="half" idx="10"/>
+          </p:nvPr>
+        </p:nvSpPr>
+        <p:spPr/>
+        <p:txBody>
+          <a:bodyPr/>
+          <a:lstStyle/>
+          <a:p>
+            <a:fld id="{0701CA8D-836C-435C-BDFA-15379F13BE3A}" type="datetime1">
               <a:rPr lang="en-US" smtClean="0"/>
-              <a:t>Click to edit Master title style</a:t>
-            </a:r>
-            <a:endParaRPr lang="en-US" dirty="0"/>
-          </a:p>
-        </p:txBody>
-      </p:sp>
-      <p:sp>
-        <p:nvSpPr>
-          <p:cNvPr id="3" name="Date Placeholder 2"/>
-          <p:cNvSpPr>
-            <a:spLocks noGrp="1"/>
-          </p:cNvSpPr>
-          <p:nvPr>
-            <p:ph type="dt" sz="half" idx="10"/>
-          </p:nvPr>
-        </p:nvSpPr>
-        <p:spPr/>
-        <p:txBody>
-          <a:bodyPr/>
-          <a:lstStyle/>
-          <a:p>
-            <a:fld id="{4F170639-886C-4FCF-9EAB-ABB5DA3F3F4A}" type="datetimeFigureOut">
-              <a:rPr lang="en-US" dirty="0"/>
-              <a:t>2/24/2016</a:t>
+              <a:t>10/3/2016</a:t>
             </a:fld>
             <a:endParaRPr lang="en-US" dirty="0"/>
           </a:p>
@@ -2070,9 +2423,9 @@
           <a:bodyPr/>
           <a:lstStyle/>
           <a:p>
-            <a:fld id="{22230651-31F4-45D2-98AE-A2108F41BC07}" type="datetimeFigureOut">
-              <a:rPr lang="en-US" dirty="0"/>
-              <a:t>2/24/2016</a:t>
+            <a:fld id="{5F45063F-F2E4-493E-AC30-498EFFCA5E06}" type="datetime1">
+              <a:rPr lang="en-US" smtClean="0"/>
+              <a:t>10/3/2016</a:t>
             </a:fld>
             <a:endParaRPr lang="en-US" dirty="0"/>
           </a:p>
@@ -2172,7 +2525,7 @@
           </a:lstStyle>
           <a:p>
             <a:r>
-              <a:rPr lang="en-US" smtClean="0"/>
+              <a:rPr lang="en-US"/>
               <a:t>Click to edit Master title style</a:t>
             </a:r>
             <a:endParaRPr lang="en-US" dirty="0"/>
@@ -2229,35 +2582,35 @@
           <a:p>
             <a:pPr lvl="0"/>
             <a:r>
-              <a:rPr lang="en-US" smtClean="0"/>
+              <a:rPr lang="en-US"/>
               <a:t>Click to edit Master text styles</a:t>
             </a:r>
           </a:p>
           <a:p>
             <a:pPr lvl="1"/>
             <a:r>
-              <a:rPr lang="en-US" smtClean="0"/>
+              <a:rPr lang="en-US"/>
               <a:t>Second level</a:t>
             </a:r>
           </a:p>
           <a:p>
             <a:pPr lvl="2"/>
             <a:r>
-              <a:rPr lang="en-US" smtClean="0"/>
+              <a:rPr lang="en-US"/>
               <a:t>Third level</a:t>
             </a:r>
           </a:p>
           <a:p>
             <a:pPr lvl="3"/>
             <a:r>
-              <a:rPr lang="en-US" smtClean="0"/>
+              <a:rPr lang="en-US"/>
               <a:t>Fourth level</a:t>
             </a:r>
           </a:p>
           <a:p>
             <a:pPr lvl="4"/>
             <a:r>
-              <a:rPr lang="en-US" smtClean="0"/>
+              <a:rPr lang="en-US"/>
               <a:t>Fifth level</a:t>
             </a:r>
             <a:endParaRPr lang="en-US" dirty="0"/>
@@ -2331,30 +2684,30 @@
           <a:p>
             <a:pPr lvl="0"/>
             <a:r>
+              <a:rPr lang="en-US"/>
+              <a:t>Click to edit Master text styles</a:t>
+            </a:r>
+          </a:p>
+        </p:txBody>
+      </p:sp>
+      <p:sp>
+        <p:nvSpPr>
+          <p:cNvPr id="5" name="Date Placeholder 4"/>
+          <p:cNvSpPr>
+            <a:spLocks noGrp="1"/>
+          </p:cNvSpPr>
+          <p:nvPr>
+            <p:ph type="dt" sz="half" idx="10"/>
+          </p:nvPr>
+        </p:nvSpPr>
+        <p:spPr/>
+        <p:txBody>
+          <a:bodyPr/>
+          <a:lstStyle/>
+          <a:p>
+            <a:fld id="{CC3C6118-ECC7-4514-A32D-7833F3D59C03}" type="datetime1">
               <a:rPr lang="en-US" smtClean="0"/>
-              <a:t>Click to edit Master text styles</a:t>
-            </a:r>
-          </a:p>
-        </p:txBody>
-      </p:sp>
-      <p:sp>
-        <p:nvSpPr>
-          <p:cNvPr id="5" name="Date Placeholder 4"/>
-          <p:cNvSpPr>
-            <a:spLocks noGrp="1"/>
-          </p:cNvSpPr>
-          <p:nvPr>
-            <p:ph type="dt" sz="half" idx="10"/>
-          </p:nvPr>
-        </p:nvSpPr>
-        <p:spPr/>
-        <p:txBody>
-          <a:bodyPr/>
-          <a:lstStyle/>
-          <a:p>
-            <a:fld id="{6F53789A-C914-4DB1-8815-80B5EC7335C5}" type="datetimeFigureOut">
-              <a:rPr lang="en-US" dirty="0"/>
-              <a:t>2/24/2016</a:t>
+              <a:t>10/3/2016</a:t>
             </a:fld>
             <a:endParaRPr lang="en-US" dirty="0"/>
           </a:p>
@@ -2496,7 +2849,7 @@
           </a:lstStyle>
           <a:p>
             <a:r>
-              <a:rPr lang="en-US" smtClean="0"/>
+              <a:rPr lang="en-US"/>
               <a:t>Click to edit Master title style</a:t>
             </a:r>
             <a:endParaRPr lang="en-US" dirty="0"/>
@@ -2571,7 +2924,7 @@
           </a:lstStyle>
           <a:p>
             <a:r>
-              <a:rPr lang="en-US" smtClean="0"/>
+              <a:rPr lang="en-US"/>
               <a:t>Drag picture to placeholder or click icon to add</a:t>
             </a:r>
             <a:endParaRPr lang="en-US" dirty="0"/>
@@ -2651,30 +3004,30 @@
           <a:p>
             <a:pPr lvl="0"/>
             <a:r>
+              <a:rPr lang="en-US"/>
+              <a:t>Click to edit Master text styles</a:t>
+            </a:r>
+          </a:p>
+        </p:txBody>
+      </p:sp>
+      <p:sp>
+        <p:nvSpPr>
+          <p:cNvPr id="5" name="Date Placeholder 4"/>
+          <p:cNvSpPr>
+            <a:spLocks noGrp="1"/>
+          </p:cNvSpPr>
+          <p:nvPr>
+            <p:ph type="dt" sz="half" idx="10"/>
+          </p:nvPr>
+        </p:nvSpPr>
+        <p:spPr/>
+        <p:txBody>
+          <a:bodyPr/>
+          <a:lstStyle/>
+          <a:p>
+            <a:fld id="{23A5285D-19A0-4ABF-83BE-6864E6A995A4}" type="datetime1">
               <a:rPr lang="en-US" smtClean="0"/>
-              <a:t>Click to edit Master text styles</a:t>
-            </a:r>
-          </a:p>
-        </p:txBody>
-      </p:sp>
-      <p:sp>
-        <p:nvSpPr>
-          <p:cNvPr id="5" name="Date Placeholder 4"/>
-          <p:cNvSpPr>
-            <a:spLocks noGrp="1"/>
-          </p:cNvSpPr>
-          <p:nvPr>
-            <p:ph type="dt" sz="half" idx="10"/>
-          </p:nvPr>
-        </p:nvSpPr>
-        <p:spPr/>
-        <p:txBody>
-          <a:bodyPr/>
-          <a:lstStyle/>
-          <a:p>
-            <a:fld id="{5E6440AA-91A0-436F-8FDB-C0F939DCAE21}" type="datetimeFigureOut">
-              <a:rPr lang="en-US" dirty="0"/>
-              <a:t>2/24/2016</a:t>
+              <a:t>10/3/2016</a:t>
             </a:fld>
             <a:endParaRPr lang="en-US" dirty="0"/>
           </a:p>
@@ -2818,7 +3171,7 @@
           <a:lstStyle/>
           <a:p>
             <a:r>
-              <a:rPr lang="en-US" smtClean="0"/>
+              <a:rPr lang="en-US"/>
               <a:t>Click to edit Master title style</a:t>
             </a:r>
             <a:endParaRPr lang="en-US" dirty="0"/>
@@ -2852,35 +3205,35 @@
           <a:p>
             <a:pPr lvl="0"/>
             <a:r>
-              <a:rPr lang="en-US" smtClean="0"/>
+              <a:rPr lang="en-US"/>
               <a:t>Click to edit Master text styles</a:t>
             </a:r>
           </a:p>
           <a:p>
             <a:pPr lvl="1"/>
             <a:r>
-              <a:rPr lang="en-US" smtClean="0"/>
+              <a:rPr lang="en-US"/>
               <a:t>Second level</a:t>
             </a:r>
           </a:p>
           <a:p>
             <a:pPr lvl="2"/>
             <a:r>
-              <a:rPr lang="en-US" smtClean="0"/>
+              <a:rPr lang="en-US"/>
               <a:t>Third level</a:t>
             </a:r>
           </a:p>
           <a:p>
             <a:pPr lvl="3"/>
             <a:r>
-              <a:rPr lang="en-US" smtClean="0"/>
+              <a:rPr lang="en-US"/>
               <a:t>Fourth level</a:t>
             </a:r>
           </a:p>
           <a:p>
             <a:pPr lvl="4"/>
             <a:r>
-              <a:rPr lang="en-US" smtClean="0"/>
+              <a:rPr lang="en-US"/>
               <a:t>Fifth level</a:t>
             </a:r>
             <a:endParaRPr lang="en-US" dirty="0"/>
@@ -2921,9 +3274,9 @@
             </a:lvl1pPr>
           </a:lstStyle>
           <a:p>
-            <a:fld id="{0E59FD0C-5451-4CA0-86AF-E70AE3279989}" type="datetimeFigureOut">
-              <a:rPr lang="en-US" dirty="0"/>
-              <a:t>2/24/2016</a:t>
+            <a:fld id="{EA70B344-8F70-4375-8833-E77BD802F242}" type="datetime1">
+              <a:rPr lang="en-US" smtClean="0"/>
+              <a:t>10/3/2016</a:t>
             </a:fld>
             <a:endParaRPr lang="en-US" dirty="0"/>
           </a:p>
@@ -3028,7 +3381,7 @@
     <p:sldLayoutId id="2147483850" r:id="rId10"/>
     <p:sldLayoutId id="2147483851" r:id="rId11"/>
   </p:sldLayoutIdLst>
-  <p:hf sldNum="0" hdr="0" ftr="0" dt="0"/>
+  <p:hf hdr="0" ftr="0" dt="0"/>
   <p:txStyles>
     <p:titleStyle>
       <a:lvl1pPr algn="l" defTabSz="914400" rtl="0" eaLnBrk="1" latinLnBrk="0" hangingPunct="1">
@@ -3424,10 +3777,9 @@
           <a:lstStyle/>
           <a:p>
             <a:r>
-              <a:rPr lang="en-US" dirty="0" smtClean="0"/>
+              <a:rPr lang="en-US" dirty="0"/>
               <a:t>Programming Fundamentals for Android</a:t>
             </a:r>
-            <a:endParaRPr lang="en-US" dirty="0"/>
           </a:p>
         </p:txBody>
       </p:sp>
@@ -3447,32 +3799,34 @@
           <a:lstStyle/>
           <a:p>
             <a:r>
-              <a:rPr lang="en-US" dirty="0" smtClean="0"/>
-              <a:t>Week </a:t>
-            </a:r>
-            <a:r>
-              <a:rPr lang="en-US" dirty="0" smtClean="0"/>
-              <a:t>6: Exception Handling</a:t>
-            </a:r>
-            <a:endParaRPr lang="en-US" dirty="0" smtClean="0"/>
-          </a:p>
-          <a:p>
-            <a:r>
-              <a:rPr lang="en-US" dirty="0" smtClean="0"/>
-              <a:t>February </a:t>
-            </a:r>
-            <a:r>
-              <a:rPr lang="en-US" dirty="0" smtClean="0"/>
-              <a:t>25</a:t>
-            </a:r>
-            <a:r>
-              <a:rPr lang="en-US" dirty="0" smtClean="0"/>
-              <a:t>, </a:t>
-            </a:r>
-            <a:r>
-              <a:rPr lang="en-US" dirty="0" smtClean="0"/>
-              <a:t>2016</a:t>
-            </a:r>
+              <a:rPr lang="en-US" dirty="0"/>
+              <a:t>Week 6: Exception Handling</a:t>
+            </a:r>
+          </a:p>
+        </p:txBody>
+      </p:sp>
+      <p:sp>
+        <p:nvSpPr>
+          <p:cNvPr id="4" name="Slide Number Placeholder 3"/>
+          <p:cNvSpPr>
+            <a:spLocks noGrp="1"/>
+          </p:cNvSpPr>
+          <p:nvPr>
+            <p:ph type="sldNum" sz="quarter" idx="12"/>
+          </p:nvPr>
+        </p:nvSpPr>
+        <p:spPr/>
+        <p:txBody>
+          <a:bodyPr>
+            <a:normAutofit lnSpcReduction="10000"/>
+          </a:bodyPr>
+          <a:lstStyle/>
+          <a:p>
+            <a:fld id="{4FAB73BC-B049-4115-A692-8D63A059BFB8}" type="slidenum">
+              <a:rPr lang="en-US" smtClean="0"/>
+              <a:pPr/>
+              <a:t>1</a:t>
+            </a:fld>
             <a:endParaRPr lang="en-US" dirty="0"/>
           </a:p>
         </p:txBody>
@@ -3523,10 +3877,9 @@
           <a:lstStyle/>
           <a:p>
             <a:r>
-              <a:rPr lang="en-US" dirty="0" smtClean="0"/>
+              <a:rPr lang="en-US" dirty="0"/>
               <a:t>Exercise</a:t>
             </a:r>
-            <a:endParaRPr lang="en-US" dirty="0"/>
           </a:p>
         </p:txBody>
       </p:sp>
@@ -3619,13 +3972,33 @@
             </a:r>
             <a:r>
               <a:rPr lang="en-US" sz="2400" dirty="0"/>
-              <a:t>, or double, depending on the method. The methods should catch any exceptions due to bad input and continue to prompt the user for input until valid input is supplied</a:t>
-            </a:r>
-            <a:r>
-              <a:rPr lang="en-US" sz="2400" dirty="0" smtClean="0"/>
-              <a:t>.</a:t>
-            </a:r>
-            <a:endParaRPr lang="en-US" sz="2400" dirty="0"/>
+              <a:t>, or double, depending on the method. The methods should catch any exceptions due to bad input and continue to prompt the user for input until valid input is supplied.</a:t>
+            </a:r>
+          </a:p>
+        </p:txBody>
+      </p:sp>
+      <p:sp>
+        <p:nvSpPr>
+          <p:cNvPr id="2" name="Slide Number Placeholder 1"/>
+          <p:cNvSpPr>
+            <a:spLocks noGrp="1"/>
+          </p:cNvSpPr>
+          <p:nvPr>
+            <p:ph type="sldNum" sz="quarter" idx="12"/>
+          </p:nvPr>
+        </p:nvSpPr>
+        <p:spPr/>
+        <p:txBody>
+          <a:bodyPr>
+            <a:normAutofit lnSpcReduction="10000"/>
+          </a:bodyPr>
+          <a:lstStyle/>
+          <a:p>
+            <a:fld id="{4FAB73BC-B049-4115-A692-8D63A059BFB8}" type="slidenum">
+              <a:rPr lang="en-US" smtClean="0"/>
+              <a:t>10</a:t>
+            </a:fld>
+            <a:endParaRPr lang="en-US" dirty="0"/>
           </a:p>
         </p:txBody>
       </p:sp>
@@ -3675,10 +4048,9 @@
           <a:lstStyle/>
           <a:p>
             <a:r>
-              <a:rPr lang="en-US" dirty="0" smtClean="0"/>
+              <a:rPr lang="en-US" dirty="0"/>
               <a:t>Corresponding Text</a:t>
             </a:r>
-            <a:endParaRPr lang="en-US" dirty="0"/>
           </a:p>
         </p:txBody>
       </p:sp>
@@ -3700,18 +4072,39 @@
           <a:lstStyle/>
           <a:p>
             <a:r>
-              <a:rPr lang="en-US" sz="2800" i="1" dirty="0" smtClean="0"/>
+              <a:rPr lang="en-US" sz="2800" i="1" dirty="0"/>
               <a:t>Learn Java for Android Development</a:t>
             </a:r>
             <a:r>
-              <a:rPr lang="en-US" sz="2800" dirty="0" smtClean="0"/>
-              <a:t>, pp. </a:t>
-            </a:r>
-            <a:r>
-              <a:rPr lang="en-US" sz="2800" dirty="0" smtClean="0"/>
-              <a:t>217-232</a:t>
+              <a:rPr lang="en-US" sz="2800" dirty="0"/>
+              <a:t>, pp. 217-232</a:t>
             </a:r>
             <a:endParaRPr lang="en-US" sz="2800" i="1" dirty="0"/>
+          </a:p>
+        </p:txBody>
+      </p:sp>
+      <p:sp>
+        <p:nvSpPr>
+          <p:cNvPr id="4" name="Slide Number Placeholder 3"/>
+          <p:cNvSpPr>
+            <a:spLocks noGrp="1"/>
+          </p:cNvSpPr>
+          <p:nvPr>
+            <p:ph type="sldNum" sz="quarter" idx="12"/>
+          </p:nvPr>
+        </p:nvSpPr>
+        <p:spPr/>
+        <p:txBody>
+          <a:bodyPr>
+            <a:normAutofit lnSpcReduction="10000"/>
+          </a:bodyPr>
+          <a:lstStyle/>
+          <a:p>
+            <a:fld id="{4FAB73BC-B049-4115-A692-8D63A059BFB8}" type="slidenum">
+              <a:rPr lang="en-US" smtClean="0"/>
+              <a:t>2</a:t>
+            </a:fld>
+            <a:endParaRPr lang="en-US" dirty="0"/>
           </a:p>
         </p:txBody>
       </p:sp>
@@ -3761,10 +4154,9 @@
           <a:lstStyle/>
           <a:p>
             <a:r>
-              <a:rPr lang="en-US" dirty="0" smtClean="0"/>
+              <a:rPr lang="en-US" dirty="0"/>
               <a:t>Exceptions</a:t>
             </a:r>
-            <a:endParaRPr lang="en-US" dirty="0"/>
           </a:p>
         </p:txBody>
       </p:sp>
@@ -3786,35 +4178,52 @@
           <a:lstStyle/>
           <a:p>
             <a:r>
-              <a:rPr lang="en-US" sz="3200" dirty="0" smtClean="0"/>
+              <a:rPr lang="en-US" sz="3200" dirty="0"/>
               <a:t>An interruption in normal behavior of program</a:t>
             </a:r>
-            <a:endParaRPr lang="en-US" sz="3200" dirty="0" smtClean="0"/>
-          </a:p>
-          <a:p>
-            <a:r>
-              <a:rPr lang="en-US" sz="3200" dirty="0" smtClean="0"/>
+          </a:p>
+          <a:p>
+            <a:r>
+              <a:rPr lang="en-US" sz="3200" dirty="0"/>
               <a:t>Exceptions that cannot be prevented can be addressed with workarounds</a:t>
             </a:r>
-            <a:endParaRPr lang="en-US" sz="3200" dirty="0" smtClean="0"/>
-          </a:p>
-          <a:p>
-            <a:r>
-              <a:rPr lang="en-US" sz="3200" dirty="0" smtClean="0"/>
+          </a:p>
+          <a:p>
+            <a:r>
+              <a:rPr lang="en-US" sz="3200" dirty="0"/>
               <a:t>Exceptions that can be prevented are often due to bad code and should be fixed</a:t>
             </a:r>
-            <a:endParaRPr lang="en-US" sz="3200" dirty="0" smtClean="0"/>
-          </a:p>
-          <a:p>
-            <a:r>
-              <a:rPr lang="en-US" sz="3200" dirty="0" smtClean="0"/>
-              <a:t>An interrup</a:t>
-            </a:r>
-            <a:r>
-              <a:rPr lang="en-US" sz="3200" dirty="0" smtClean="0"/>
-              <a:t>tion that cannot be prevented or worked-around is an error</a:t>
-            </a:r>
-            <a:endParaRPr lang="en-US" sz="3200" dirty="0" smtClean="0"/>
+          </a:p>
+          <a:p>
+            <a:r>
+              <a:rPr lang="en-US" sz="3200" dirty="0"/>
+              <a:t>An interruption that cannot be prevented or worked-around is an error</a:t>
+            </a:r>
+          </a:p>
+        </p:txBody>
+      </p:sp>
+      <p:sp>
+        <p:nvSpPr>
+          <p:cNvPr id="4" name="Slide Number Placeholder 3"/>
+          <p:cNvSpPr>
+            <a:spLocks noGrp="1"/>
+          </p:cNvSpPr>
+          <p:nvPr>
+            <p:ph type="sldNum" sz="quarter" idx="12"/>
+          </p:nvPr>
+        </p:nvSpPr>
+        <p:spPr/>
+        <p:txBody>
+          <a:bodyPr>
+            <a:normAutofit lnSpcReduction="10000"/>
+          </a:bodyPr>
+          <a:lstStyle/>
+          <a:p>
+            <a:fld id="{4FAB73BC-B049-4115-A692-8D63A059BFB8}" type="slidenum">
+              <a:rPr lang="en-US" smtClean="0"/>
+              <a:t>3</a:t>
+            </a:fld>
+            <a:endParaRPr lang="en-US" dirty="0"/>
           </a:p>
         </p:txBody>
       </p:sp>
@@ -3864,14 +4273,13 @@
           <a:lstStyle/>
           <a:p>
             <a:r>
-              <a:rPr lang="en-US" dirty="0" err="1" smtClean="0"/>
+              <a:rPr lang="en-US" dirty="0" err="1"/>
               <a:t>Throwable</a:t>
             </a:r>
             <a:r>
-              <a:rPr lang="en-US" dirty="0" smtClean="0"/>
+              <a:rPr lang="en-US" dirty="0"/>
               <a:t> Class</a:t>
             </a:r>
-            <a:endParaRPr lang="en-US" dirty="0"/>
           </a:p>
         </p:txBody>
       </p:sp>
@@ -3893,52 +4301,72 @@
           <a:lstStyle/>
           <a:p>
             <a:r>
-              <a:rPr lang="en-US" sz="2400" dirty="0" smtClean="0"/>
+              <a:rPr lang="en-US" sz="2400" dirty="0"/>
               <a:t>When an exception or error occurs, a new object with context details is created</a:t>
             </a:r>
           </a:p>
           <a:p>
             <a:r>
-              <a:rPr lang="en-US" sz="2400" dirty="0" smtClean="0"/>
+              <a:rPr lang="en-US" sz="2400" dirty="0"/>
               <a:t>The new object is </a:t>
             </a:r>
             <a:r>
-              <a:rPr lang="en-US" sz="2400" i="1" dirty="0" smtClean="0"/>
+              <a:rPr lang="en-US" sz="2400" i="1" dirty="0"/>
               <a:t>thrown</a:t>
             </a:r>
             <a:r>
-              <a:rPr lang="en-US" sz="2400" dirty="0" smtClean="0"/>
+              <a:rPr lang="en-US" sz="2400" dirty="0"/>
               <a:t> and execution stops to search for code to handle the exception or error</a:t>
             </a:r>
           </a:p>
           <a:p>
             <a:r>
-              <a:rPr lang="en-US" sz="2400" dirty="0" smtClean="0"/>
-              <a:t>Our code often includes methods calling other methods; when an exception occurs, we can see which methods wer</a:t>
-            </a:r>
-            <a:r>
-              <a:rPr lang="en-US" sz="2400" dirty="0" smtClean="0"/>
-              <a:t>e involved by examining the </a:t>
-            </a:r>
-            <a:r>
-              <a:rPr lang="en-US" sz="2400" i="1" dirty="0" smtClean="0"/>
+              <a:rPr lang="en-US" sz="2400" dirty="0"/>
+              <a:t>Our code often includes methods calling other methods; when an exception occurs, we can see which methods were involved by examining the </a:t>
+            </a:r>
+            <a:r>
+              <a:rPr lang="en-US" sz="2400" i="1" dirty="0"/>
               <a:t>stack trace</a:t>
             </a:r>
           </a:p>
           <a:p>
             <a:r>
-              <a:rPr lang="en-US" sz="2400" dirty="0" smtClean="0"/>
+              <a:rPr lang="en-US" sz="2400" dirty="0"/>
               <a:t>Java provides two classes, Exception and Error, for exceptions and errors; these are subclasses of the </a:t>
             </a:r>
             <a:r>
-              <a:rPr lang="en-US" sz="2400" dirty="0" err="1" smtClean="0"/>
+              <a:rPr lang="en-US" sz="2400" dirty="0" err="1"/>
               <a:t>Throwable</a:t>
             </a:r>
             <a:r>
-              <a:rPr lang="en-US" sz="2400" dirty="0" smtClean="0"/>
+              <a:rPr lang="en-US" sz="2400" dirty="0"/>
               <a:t> base class</a:t>
             </a:r>
-            <a:endParaRPr lang="en-US" sz="2400" dirty="0"/>
+          </a:p>
+        </p:txBody>
+      </p:sp>
+      <p:sp>
+        <p:nvSpPr>
+          <p:cNvPr id="4" name="Slide Number Placeholder 3"/>
+          <p:cNvSpPr>
+            <a:spLocks noGrp="1"/>
+          </p:cNvSpPr>
+          <p:nvPr>
+            <p:ph type="sldNum" sz="quarter" idx="12"/>
+          </p:nvPr>
+        </p:nvSpPr>
+        <p:spPr/>
+        <p:txBody>
+          <a:bodyPr>
+            <a:normAutofit lnSpcReduction="10000"/>
+          </a:bodyPr>
+          <a:lstStyle/>
+          <a:p>
+            <a:fld id="{4FAB73BC-B049-4115-A692-8D63A059BFB8}" type="slidenum">
+              <a:rPr lang="en-US" smtClean="0"/>
+              <a:t>4</a:t>
+            </a:fld>
+            <a:endParaRPr lang="en-US" dirty="0"/>
           </a:p>
         </p:txBody>
       </p:sp>
@@ -3988,14 +4416,13 @@
           <a:lstStyle/>
           <a:p>
             <a:r>
-              <a:rPr lang="en-US" dirty="0" err="1" smtClean="0"/>
+              <a:rPr lang="en-US" dirty="0" err="1"/>
               <a:t>Throwable</a:t>
             </a:r>
             <a:r>
-              <a:rPr lang="en-US" dirty="0" smtClean="0"/>
+              <a:rPr lang="en-US" dirty="0"/>
               <a:t> Methods</a:t>
             </a:r>
-            <a:endParaRPr lang="en-US" dirty="0"/>
           </a:p>
         </p:txBody>
       </p:sp>
@@ -4025,8 +4452,20 @@
                 <a:tableStyleId>{5C22544A-7EE6-4342-B048-85BDC9FD1C3A}</a:tableStyleId>
               </a:tblPr>
               <a:tblGrid>
-                <a:gridCol w="4297363"/>
-                <a:gridCol w="4297363"/>
+                <a:gridCol w="4297363">
+                  <a:extLst>
+                    <a:ext uri="{9D8B030D-6E8A-4147-A177-3AD203B41FA5}">
+                      <a16:colId xmlns:a16="http://schemas.microsoft.com/office/drawing/2014/main" val="20000"/>
+                    </a:ext>
+                  </a:extLst>
+                </a:gridCol>
+                <a:gridCol w="4297363">
+                  <a:extLst>
+                    <a:ext uri="{9D8B030D-6E8A-4147-A177-3AD203B41FA5}">
+                      <a16:colId xmlns:a16="http://schemas.microsoft.com/office/drawing/2014/main" val="20001"/>
+                    </a:ext>
+                  </a:extLst>
+                </a:gridCol>
               </a:tblGrid>
               <a:tr h="370840">
                 <a:tc>
@@ -4057,6 +4496,11 @@
                   </a:txBody>
                   <a:tcPr anchor="ctr"/>
                 </a:tc>
+                <a:extLst>
+                  <a:ext uri="{0D108BD9-81ED-4DB2-BD59-A6C34878D82A}">
+                    <a16:rowId xmlns:a16="http://schemas.microsoft.com/office/drawing/2014/main" val="10000"/>
+                  </a:ext>
+                </a:extLst>
               </a:tr>
               <a:tr h="370840">
                 <a:tc>
@@ -4087,6 +4531,11 @@
                   </a:txBody>
                   <a:tcPr anchor="ctr"/>
                 </a:tc>
+                <a:extLst>
+                  <a:ext uri="{0D108BD9-81ED-4DB2-BD59-A6C34878D82A}">
+                    <a16:rowId xmlns:a16="http://schemas.microsoft.com/office/drawing/2014/main" val="10001"/>
+                  </a:ext>
+                </a:extLst>
               </a:tr>
               <a:tr h="370840">
                 <a:tc>
@@ -4117,6 +4566,11 @@
                   </a:txBody>
                   <a:tcPr anchor="ctr"/>
                 </a:tc>
+                <a:extLst>
+                  <a:ext uri="{0D108BD9-81ED-4DB2-BD59-A6C34878D82A}">
+                    <a16:rowId xmlns:a16="http://schemas.microsoft.com/office/drawing/2014/main" val="10002"/>
+                  </a:ext>
+                </a:extLst>
               </a:tr>
               <a:tr h="370840">
                 <a:tc>
@@ -4147,6 +4601,11 @@
                   </a:txBody>
                   <a:tcPr anchor="ctr"/>
                 </a:tc>
+                <a:extLst>
+                  <a:ext uri="{0D108BD9-81ED-4DB2-BD59-A6C34878D82A}">
+                    <a16:rowId xmlns:a16="http://schemas.microsoft.com/office/drawing/2014/main" val="10003"/>
+                  </a:ext>
+                </a:extLst>
               </a:tr>
               <a:tr h="370840">
                 <a:tc>
@@ -4177,6 +4636,11 @@
                   </a:txBody>
                   <a:tcPr anchor="ctr"/>
                 </a:tc>
+                <a:extLst>
+                  <a:ext uri="{0D108BD9-81ED-4DB2-BD59-A6C34878D82A}">
+                    <a16:rowId xmlns:a16="http://schemas.microsoft.com/office/drawing/2014/main" val="10004"/>
+                  </a:ext>
+                </a:extLst>
               </a:tr>
               <a:tr h="370840">
                 <a:tc>
@@ -4207,6 +4671,11 @@
                   </a:txBody>
                   <a:tcPr anchor="ctr"/>
                 </a:tc>
+                <a:extLst>
+                  <a:ext uri="{0D108BD9-81ED-4DB2-BD59-A6C34878D82A}">
+                    <a16:rowId xmlns:a16="http://schemas.microsoft.com/office/drawing/2014/main" val="10005"/>
+                  </a:ext>
+                </a:extLst>
               </a:tr>
               <a:tr h="370840">
                 <a:tc>
@@ -4237,6 +4706,11 @@
                   </a:txBody>
                   <a:tcPr anchor="ctr"/>
                 </a:tc>
+                <a:extLst>
+                  <a:ext uri="{0D108BD9-81ED-4DB2-BD59-A6C34878D82A}">
+                    <a16:rowId xmlns:a16="http://schemas.microsoft.com/office/drawing/2014/main" val="10006"/>
+                  </a:ext>
+                </a:extLst>
               </a:tr>
               <a:tr h="370840">
                 <a:tc>
@@ -4267,11 +4741,41 @@
                   </a:txBody>
                   <a:tcPr anchor="ctr"/>
                 </a:tc>
+                <a:extLst>
+                  <a:ext uri="{0D108BD9-81ED-4DB2-BD59-A6C34878D82A}">
+                    <a16:rowId xmlns:a16="http://schemas.microsoft.com/office/drawing/2014/main" val="10007"/>
+                  </a:ext>
+                </a:extLst>
               </a:tr>
             </a:tbl>
           </a:graphicData>
         </a:graphic>
       </p:graphicFrame>
+      <p:sp>
+        <p:nvSpPr>
+          <p:cNvPr id="2" name="Slide Number Placeholder 1"/>
+          <p:cNvSpPr>
+            <a:spLocks noGrp="1"/>
+          </p:cNvSpPr>
+          <p:nvPr>
+            <p:ph type="sldNum" sz="quarter" idx="12"/>
+          </p:nvPr>
+        </p:nvSpPr>
+        <p:spPr/>
+        <p:txBody>
+          <a:bodyPr>
+            <a:normAutofit lnSpcReduction="10000"/>
+          </a:bodyPr>
+          <a:lstStyle/>
+          <a:p>
+            <a:fld id="{4FAB73BC-B049-4115-A692-8D63A059BFB8}" type="slidenum">
+              <a:rPr lang="en-US" smtClean="0"/>
+              <a:t>5</a:t>
+            </a:fld>
+            <a:endParaRPr lang="en-US" dirty="0"/>
+          </a:p>
+        </p:txBody>
+      </p:sp>
     </p:spTree>
     <p:extLst>
       <p:ext uri="{BB962C8B-B14F-4D97-AF65-F5344CB8AC3E}">
@@ -4318,10 +4822,9 @@
           <a:lstStyle/>
           <a:p>
             <a:r>
-              <a:rPr lang="en-US" dirty="0" smtClean="0"/>
+              <a:rPr lang="en-US" dirty="0"/>
               <a:t>Checked and Runtime Exceptions</a:t>
             </a:r>
-            <a:endParaRPr lang="en-US" dirty="0"/>
           </a:p>
         </p:txBody>
       </p:sp>
@@ -4343,44 +4846,68 @@
           <a:lstStyle/>
           <a:p>
             <a:r>
-              <a:rPr lang="en-US" sz="2400" b="1" dirty="0" smtClean="0"/>
+              <a:rPr lang="en-US" sz="2400" b="1" dirty="0"/>
               <a:t>Checked exceptions</a:t>
             </a:r>
             <a:r>
-              <a:rPr lang="en-US" sz="2400" dirty="0" smtClean="0"/>
+              <a:rPr lang="en-US" sz="2400" dirty="0"/>
               <a:t> represent problems from which it is possible for the program to recover and for which workarounds must be provided</a:t>
             </a:r>
           </a:p>
           <a:p>
             <a:r>
-              <a:rPr lang="en-US" sz="2400" dirty="0" smtClean="0"/>
+              <a:rPr lang="en-US" sz="2400" dirty="0"/>
               <a:t>The compiler checks to ensure all checked exceptions are handled.</a:t>
             </a:r>
           </a:p>
           <a:p>
             <a:r>
-              <a:rPr lang="en-US" sz="2400" b="1" dirty="0" smtClean="0"/>
+              <a:rPr lang="en-US" sz="2400" b="1" dirty="0"/>
               <a:t>Unchecked </a:t>
             </a:r>
             <a:r>
-              <a:rPr lang="en-US" sz="2400" dirty="0" smtClean="0"/>
+              <a:rPr lang="en-US" sz="2400" dirty="0"/>
               <a:t>or</a:t>
             </a:r>
             <a:r>
-              <a:rPr lang="en-US" sz="2400" b="1" dirty="0" smtClean="0"/>
+              <a:rPr lang="en-US" sz="2400" b="1" dirty="0"/>
               <a:t> runtime exceptions </a:t>
             </a:r>
             <a:r>
-              <a:rPr lang="en-US" sz="2400" dirty="0" smtClean="0"/>
+              <a:rPr lang="en-US" sz="2400" dirty="0"/>
               <a:t>is a problem that doesn’t need to be handled elsewhere in the code but often represents a coding mistake</a:t>
             </a:r>
           </a:p>
           <a:p>
             <a:r>
-              <a:rPr lang="en-US" sz="2400" dirty="0" smtClean="0"/>
+              <a:rPr lang="en-US" sz="2400" dirty="0"/>
               <a:t>We’ll often see code for handling unchecked exceptions</a:t>
             </a:r>
-            <a:endParaRPr lang="en-US" sz="2400" dirty="0"/>
+          </a:p>
+        </p:txBody>
+      </p:sp>
+      <p:sp>
+        <p:nvSpPr>
+          <p:cNvPr id="2" name="Slide Number Placeholder 1"/>
+          <p:cNvSpPr>
+            <a:spLocks noGrp="1"/>
+          </p:cNvSpPr>
+          <p:nvPr>
+            <p:ph type="sldNum" sz="quarter" idx="12"/>
+          </p:nvPr>
+        </p:nvSpPr>
+        <p:spPr/>
+        <p:txBody>
+          <a:bodyPr>
+            <a:normAutofit lnSpcReduction="10000"/>
+          </a:bodyPr>
+          <a:lstStyle/>
+          <a:p>
+            <a:fld id="{4FAB73BC-B049-4115-A692-8D63A059BFB8}" type="slidenum">
+              <a:rPr lang="en-US" smtClean="0"/>
+              <a:t>6</a:t>
+            </a:fld>
+            <a:endParaRPr lang="en-US" dirty="0"/>
           </a:p>
         </p:txBody>
       </p:sp>
@@ -4430,10 +4957,9 @@
           <a:lstStyle/>
           <a:p>
             <a:r>
-              <a:rPr lang="en-US" dirty="0" smtClean="0"/>
+              <a:rPr lang="en-US" dirty="0"/>
               <a:t>Throwing Exceptions</a:t>
             </a:r>
-            <a:endParaRPr lang="en-US" dirty="0"/>
           </a:p>
         </p:txBody>
       </p:sp>
@@ -4455,24 +4981,48 @@
           <a:lstStyle/>
           <a:p>
             <a:r>
-              <a:rPr lang="en-US" sz="2800" dirty="0" smtClean="0"/>
+              <a:rPr lang="en-US" sz="2800" dirty="0"/>
               <a:t>If an exception occurs in a method and we want the calling method to deal with it, we can </a:t>
             </a:r>
             <a:r>
-              <a:rPr lang="en-US" sz="2800" i="1" dirty="0" smtClean="0"/>
+              <a:rPr lang="en-US" sz="2800" i="1" dirty="0"/>
               <a:t>throw</a:t>
             </a:r>
             <a:r>
-              <a:rPr lang="en-US" sz="2800" dirty="0" smtClean="0"/>
+              <a:rPr lang="en-US" sz="2800" dirty="0"/>
               <a:t> the exception</a:t>
             </a:r>
           </a:p>
           <a:p>
             <a:r>
-              <a:rPr lang="en-US" sz="2800" dirty="0" smtClean="0"/>
+              <a:rPr lang="en-US" sz="2800" dirty="0"/>
               <a:t>If a method throws a checked exception, the exception must be specified as part of the method header</a:t>
             </a:r>
-            <a:endParaRPr lang="en-US" sz="2800" dirty="0"/>
+          </a:p>
+        </p:txBody>
+      </p:sp>
+      <p:sp>
+        <p:nvSpPr>
+          <p:cNvPr id="2" name="Slide Number Placeholder 1"/>
+          <p:cNvSpPr>
+            <a:spLocks noGrp="1"/>
+          </p:cNvSpPr>
+          <p:nvPr>
+            <p:ph type="sldNum" sz="quarter" idx="12"/>
+          </p:nvPr>
+        </p:nvSpPr>
+        <p:spPr/>
+        <p:txBody>
+          <a:bodyPr>
+            <a:normAutofit lnSpcReduction="10000"/>
+          </a:bodyPr>
+          <a:lstStyle/>
+          <a:p>
+            <a:fld id="{4FAB73BC-B049-4115-A692-8D63A059BFB8}" type="slidenum">
+              <a:rPr lang="en-US" smtClean="0"/>
+              <a:t>7</a:t>
+            </a:fld>
+            <a:endParaRPr lang="en-US" dirty="0"/>
           </a:p>
         </p:txBody>
       </p:sp>
@@ -4522,10 +5072,9 @@
           <a:lstStyle/>
           <a:p>
             <a:r>
-              <a:rPr lang="en-US" dirty="0" smtClean="0"/>
+              <a:rPr lang="en-US" dirty="0"/>
               <a:t>Handling Exceptions</a:t>
             </a:r>
-            <a:endParaRPr lang="en-US" dirty="0"/>
           </a:p>
         </p:txBody>
       </p:sp>
@@ -4547,32 +5096,31 @@
           <a:lstStyle/>
           <a:p>
             <a:r>
-              <a:rPr lang="en-US" sz="2400" dirty="0" smtClean="0"/>
+              <a:rPr lang="en-US" sz="2400" dirty="0"/>
               <a:t>Can use </a:t>
             </a:r>
             <a:r>
-              <a:rPr lang="en-US" sz="2400" i="1" dirty="0" smtClean="0"/>
+              <a:rPr lang="en-US" sz="2400" i="1" dirty="0"/>
               <a:t>try-catch blocks</a:t>
             </a:r>
             <a:r>
-              <a:rPr lang="en-US" sz="2400" dirty="0" smtClean="0"/>
+              <a:rPr lang="en-US" sz="2400" dirty="0"/>
               <a:t> to deal with or </a:t>
             </a:r>
             <a:r>
-              <a:rPr lang="en-US" sz="2400" i="1" dirty="0" smtClean="0"/>
+              <a:rPr lang="en-US" sz="2400" i="1" dirty="0"/>
               <a:t>handle </a:t>
             </a:r>
             <a:r>
-              <a:rPr lang="en-US" sz="2400" dirty="0" smtClean="0"/>
+              <a:rPr lang="en-US" sz="2400" dirty="0"/>
               <a:t>both checked and unchecked exceptions</a:t>
             </a:r>
           </a:p>
           <a:p>
             <a:r>
-              <a:rPr lang="en-US" sz="2400" dirty="0" smtClean="0"/>
+              <a:rPr lang="en-US" sz="2400" dirty="0"/>
               <a:t>Generally, put a few statements as necessary in the try block and be specific about types of exceptions in the catch block</a:t>
             </a:r>
-            <a:endParaRPr lang="en-US" sz="2400" dirty="0"/>
           </a:p>
         </p:txBody>
       </p:sp>
@@ -4654,7 +5202,7 @@
               <a:tabLst/>
             </a:pPr>
             <a:r>
-              <a:rPr kumimoji="0" lang="en-US" altLang="en-US" sz="2000" b="0" i="0" u="none" strike="noStrike" cap="none" normalizeH="0" baseline="0" dirty="0" smtClean="0">
+              <a:rPr kumimoji="0" lang="en-US" altLang="en-US" sz="2000" b="0" i="0" u="none" strike="noStrike" cap="none" normalizeH="0" baseline="0" dirty="0">
                 <a:ln>
                   <a:noFill/>
                 </a:ln>
@@ -4691,19 +5239,10 @@
                 </a:solidFill>
                 <a:latin typeface="Consolas" panose="020B0609020204030204" pitchFamily="49" charset="0"/>
               </a:rPr>
-              <a:t> </a:t>
-            </a:r>
-            <a:r>
-              <a:rPr lang="en-US" altLang="en-US" sz="2000" dirty="0" smtClean="0">
-                <a:solidFill>
-                  <a:srgbClr val="FF0000"/>
-                </a:solidFill>
-                <a:latin typeface="Consolas" panose="020B0609020204030204" pitchFamily="49" charset="0"/>
-              </a:rPr>
-              <a:t>   </a:t>
-            </a:r>
-            <a:r>
-              <a:rPr kumimoji="0" lang="en-US" altLang="en-US" sz="2000" b="0" i="0" u="none" strike="noStrike" cap="none" normalizeH="0" baseline="0" dirty="0" smtClean="0">
+              <a:t>    </a:t>
+            </a:r>
+            <a:r>
+              <a:rPr kumimoji="0" lang="en-US" altLang="en-US" sz="2000" b="0" i="0" u="none" strike="noStrike" cap="none" normalizeH="0" baseline="0" dirty="0">
                 <a:ln>
                   <a:noFill/>
                 </a:ln>
@@ -4740,19 +5279,10 @@
                 </a:solidFill>
                 <a:latin typeface="Consolas" panose="020B0609020204030204" pitchFamily="49" charset="0"/>
               </a:rPr>
-              <a:t> </a:t>
-            </a:r>
-            <a:r>
-              <a:rPr lang="en-US" altLang="en-US" sz="2000" dirty="0" smtClean="0">
-                <a:solidFill>
-                  <a:srgbClr val="FF0000"/>
-                </a:solidFill>
-                <a:latin typeface="Consolas" panose="020B0609020204030204" pitchFamily="49" charset="0"/>
-              </a:rPr>
-              <a:t>   //</a:t>
-            </a:r>
-            <a:r>
-              <a:rPr kumimoji="0" lang="en-US" altLang="en-US" sz="2000" b="0" i="0" u="none" strike="noStrike" cap="none" normalizeH="0" baseline="0" dirty="0" smtClean="0">
+              <a:t>    //</a:t>
+            </a:r>
+            <a:r>
+              <a:rPr kumimoji="0" lang="en-US" altLang="en-US" sz="2000" b="0" i="0" u="none" strike="noStrike" cap="none" normalizeH="0" baseline="0" dirty="0">
                 <a:ln>
                   <a:noFill/>
                 </a:ln>
@@ -4783,7 +5313,7 @@
               <a:tabLst/>
             </a:pPr>
             <a:r>
-              <a:rPr kumimoji="0" lang="en-US" altLang="en-US" sz="2000" b="0" i="0" u="none" strike="noStrike" cap="none" normalizeH="0" baseline="0" dirty="0" smtClean="0">
+              <a:rPr kumimoji="0" lang="en-US" altLang="en-US" sz="2000" b="0" i="0" u="none" strike="noStrike" cap="none" normalizeH="0" baseline="0" dirty="0">
                 <a:ln>
                   <a:noFill/>
                 </a:ln>
@@ -4814,7 +5344,7 @@
               <a:tabLst/>
             </a:pPr>
             <a:r>
-              <a:rPr kumimoji="0" lang="en-US" altLang="en-US" sz="2000" b="0" i="0" u="none" strike="noStrike" cap="none" normalizeH="0" baseline="0" dirty="0" smtClean="0">
+              <a:rPr kumimoji="0" lang="en-US" altLang="en-US" sz="2000" b="0" i="0" u="none" strike="noStrike" cap="none" normalizeH="0" baseline="0" dirty="0">
                 <a:ln>
                   <a:noFill/>
                 </a:ln>
@@ -4827,7 +5357,7 @@
               <a:t>catch (</a:t>
             </a:r>
             <a:r>
-              <a:rPr kumimoji="0" lang="en-US" altLang="en-US" sz="2000" b="0" i="0" u="none" strike="noStrike" cap="none" normalizeH="0" baseline="0" dirty="0" err="1" smtClean="0">
+              <a:rPr kumimoji="0" lang="en-US" altLang="en-US" sz="2000" b="0" i="0" u="none" strike="noStrike" cap="none" normalizeH="0" baseline="0" dirty="0" err="1">
                 <a:ln>
                   <a:noFill/>
                 </a:ln>
@@ -4840,7 +5370,7 @@
               <a:t>ExceptionType</a:t>
             </a:r>
             <a:r>
-              <a:rPr kumimoji="0" lang="en-US" altLang="en-US" sz="2000" b="0" i="0" u="none" strike="noStrike" cap="none" normalizeH="0" baseline="0" dirty="0" smtClean="0">
+              <a:rPr kumimoji="0" lang="en-US" altLang="en-US" sz="2000" b="0" i="0" u="none" strike="noStrike" cap="none" normalizeH="0" baseline="0" dirty="0">
                 <a:ln>
                   <a:noFill/>
                 </a:ln>
@@ -4877,19 +5407,10 @@
                 </a:solidFill>
                 <a:latin typeface="Consolas" panose="020B0609020204030204" pitchFamily="49" charset="0"/>
               </a:rPr>
-              <a:t> </a:t>
-            </a:r>
-            <a:r>
-              <a:rPr lang="en-US" altLang="en-US" sz="2000" dirty="0" smtClean="0">
-                <a:solidFill>
-                  <a:srgbClr val="FF0000"/>
-                </a:solidFill>
-                <a:latin typeface="Consolas" panose="020B0609020204030204" pitchFamily="49" charset="0"/>
-              </a:rPr>
-              <a:t>  </a:t>
-            </a:r>
-            <a:r>
-              <a:rPr kumimoji="0" lang="en-US" altLang="en-US" sz="2000" b="0" i="0" u="none" strike="noStrike" cap="none" normalizeH="0" baseline="0" dirty="0" smtClean="0">
+              <a:t>   </a:t>
+            </a:r>
+            <a:r>
+              <a:rPr kumimoji="0" lang="en-US" altLang="en-US" sz="2000" b="0" i="0" u="none" strike="noStrike" cap="none" normalizeH="0" baseline="0" dirty="0">
                 <a:ln>
                   <a:noFill/>
                 </a:ln>
@@ -4926,19 +5447,10 @@
                 </a:solidFill>
                 <a:latin typeface="Consolas" panose="020B0609020204030204" pitchFamily="49" charset="0"/>
               </a:rPr>
-              <a:t> </a:t>
-            </a:r>
-            <a:r>
-              <a:rPr lang="en-US" altLang="en-US" sz="2000" dirty="0" smtClean="0">
-                <a:solidFill>
-                  <a:srgbClr val="FF0000"/>
-                </a:solidFill>
-                <a:latin typeface="Consolas" panose="020B0609020204030204" pitchFamily="49" charset="0"/>
-              </a:rPr>
-              <a:t>  //</a:t>
-            </a:r>
-            <a:r>
-              <a:rPr kumimoji="0" lang="en-US" altLang="en-US" sz="2000" b="0" i="0" u="none" strike="noStrike" cap="none" normalizeH="0" baseline="0" dirty="0" smtClean="0">
+              <a:t>   //</a:t>
+            </a:r>
+            <a:r>
+              <a:rPr kumimoji="0" lang="en-US" altLang="en-US" sz="2000" b="0" i="0" u="none" strike="noStrike" cap="none" normalizeH="0" baseline="0" dirty="0">
                 <a:ln>
                   <a:noFill/>
                 </a:ln>
@@ -4969,7 +5481,7 @@
               <a:tabLst/>
             </a:pPr>
             <a:r>
-              <a:rPr kumimoji="0" lang="en-US" altLang="en-US" sz="2000" b="0" i="0" u="none" strike="noStrike" cap="none" normalizeH="0" baseline="0" dirty="0" smtClean="0">
+              <a:rPr kumimoji="0" lang="en-US" altLang="en-US" sz="2000" b="0" i="0" u="none" strike="noStrike" cap="none" normalizeH="0" baseline="0" dirty="0">
                 <a:ln>
                   <a:noFill/>
                 </a:ln>
@@ -4981,6 +5493,31 @@
               </a:rPr>
               <a:t>} </a:t>
             </a:r>
+          </a:p>
+        </p:txBody>
+      </p:sp>
+      <p:sp>
+        <p:nvSpPr>
+          <p:cNvPr id="2" name="Slide Number Placeholder 1"/>
+          <p:cNvSpPr>
+            <a:spLocks noGrp="1"/>
+          </p:cNvSpPr>
+          <p:nvPr>
+            <p:ph type="sldNum" sz="quarter" idx="12"/>
+          </p:nvPr>
+        </p:nvSpPr>
+        <p:spPr/>
+        <p:txBody>
+          <a:bodyPr>
+            <a:normAutofit lnSpcReduction="10000"/>
+          </a:bodyPr>
+          <a:lstStyle/>
+          <a:p>
+            <a:fld id="{4FAB73BC-B049-4115-A692-8D63A059BFB8}" type="slidenum">
+              <a:rPr lang="en-US" smtClean="0"/>
+              <a:t>8</a:t>
+            </a:fld>
+            <a:endParaRPr lang="en-US" dirty="0"/>
           </a:p>
         </p:txBody>
       </p:sp>
@@ -5030,10 +5567,9 @@
           <a:lstStyle/>
           <a:p>
             <a:r>
-              <a:rPr lang="en-US" dirty="0" smtClean="0"/>
+              <a:rPr lang="en-US" dirty="0"/>
               <a:t>Finally Blocks</a:t>
             </a:r>
-            <a:endParaRPr lang="en-US" dirty="0"/>
           </a:p>
         </p:txBody>
       </p:sp>
@@ -5055,21 +5591,46 @@
           <a:lstStyle/>
           <a:p>
             <a:r>
-              <a:rPr lang="en-US" sz="2000" dirty="0" smtClean="0"/>
+              <a:rPr lang="en-US" sz="2000" dirty="0"/>
               <a:t>Specified after a try block and always executed whether an exception occurs or not</a:t>
             </a:r>
           </a:p>
           <a:p>
             <a:r>
-              <a:rPr lang="en-US" sz="2000" dirty="0" smtClean="0"/>
+              <a:rPr lang="en-US" sz="2000" dirty="0"/>
               <a:t>If a catch block is specified, the finally block is executed after the catch block</a:t>
             </a:r>
           </a:p>
           <a:p>
             <a:r>
-              <a:rPr lang="en-US" sz="2000" dirty="0" smtClean="0"/>
+              <a:rPr lang="en-US" sz="2000" dirty="0"/>
               <a:t>If no catch block is specified, the finally block is executed before the exception is thrown from the method</a:t>
             </a:r>
+          </a:p>
+        </p:txBody>
+      </p:sp>
+      <p:sp>
+        <p:nvSpPr>
+          <p:cNvPr id="2" name="Slide Number Placeholder 1"/>
+          <p:cNvSpPr>
+            <a:spLocks noGrp="1"/>
+          </p:cNvSpPr>
+          <p:nvPr>
+            <p:ph type="sldNum" sz="quarter" idx="12"/>
+          </p:nvPr>
+        </p:nvSpPr>
+        <p:spPr/>
+        <p:txBody>
+          <a:bodyPr>
+            <a:normAutofit lnSpcReduction="10000"/>
+          </a:bodyPr>
+          <a:lstStyle/>
+          <a:p>
+            <a:fld id="{4FAB73BC-B049-4115-A692-8D63A059BFB8}" type="slidenum">
+              <a:rPr lang="en-US" smtClean="0"/>
+              <a:t>9</a:t>
+            </a:fld>
+            <a:endParaRPr lang="en-US" dirty="0"/>
           </a:p>
         </p:txBody>
       </p:sp>
@@ -5337,4 +5898,299 @@
     </a:ext>
   </a:extLst>
 </a:theme>
+</file>
+
+<file path=ppt/theme/theme2.xml><?xml version="1.0" encoding="utf-8"?>
+<a:theme xmlns:a="http://schemas.openxmlformats.org/drawingml/2006/main" name="Office Theme">
+  <a:themeElements>
+    <a:clrScheme name="Office">
+      <a:dk1>
+        <a:sysClr val="windowText" lastClr="000000"/>
+      </a:dk1>
+      <a:lt1>
+        <a:sysClr val="window" lastClr="FFFFFF"/>
+      </a:lt1>
+      <a:dk2>
+        <a:srgbClr val="44546A"/>
+      </a:dk2>
+      <a:lt2>
+        <a:srgbClr val="E7E6E6"/>
+      </a:lt2>
+      <a:accent1>
+        <a:srgbClr val="5B9BD5"/>
+      </a:accent1>
+      <a:accent2>
+        <a:srgbClr val="ED7D31"/>
+      </a:accent2>
+      <a:accent3>
+        <a:srgbClr val="A5A5A5"/>
+      </a:accent3>
+      <a:accent4>
+        <a:srgbClr val="FFC000"/>
+      </a:accent4>
+      <a:accent5>
+        <a:srgbClr val="4472C4"/>
+      </a:accent5>
+      <a:accent6>
+        <a:srgbClr val="70AD47"/>
+      </a:accent6>
+      <a:hlink>
+        <a:srgbClr val="0563C1"/>
+      </a:hlink>
+      <a:folHlink>
+        <a:srgbClr val="954F72"/>
+      </a:folHlink>
+    </a:clrScheme>
+    <a:fontScheme name="Office">
+      <a:majorFont>
+        <a:latin typeface="Calibri Light" panose="020F0302020204030204"/>
+        <a:ea typeface=""/>
+        <a:cs typeface=""/>
+        <a:font script="Jpan" typeface="游ゴシック Light"/>
+        <a:font script="Hang" typeface="맑은 고딕"/>
+        <a:font script="Hans" typeface="等线 Light"/>
+        <a:font script="Hant" typeface="新細明體"/>
+        <a:font script="Arab" typeface="Times New Roman"/>
+        <a:font script="Hebr" typeface="Times New Roman"/>
+        <a:font script="Thai" typeface="Angsana New"/>
+        <a:font script="Ethi" typeface="Nyala"/>
+        <a:font script="Beng" typeface="Vrinda"/>
+        <a:font script="Gujr" typeface="Shruti"/>
+        <a:font script="Khmr" typeface="MoolBoran"/>
+        <a:font script="Knda" typeface="Tunga"/>
+        <a:font script="Guru" typeface="Raavi"/>
+        <a:font script="Cans" typeface="Euphemia"/>
+        <a:font script="Cher" typeface="Plantagenet Cherokee"/>
+        <a:font script="Yiii" typeface="Microsoft Yi Baiti"/>
+        <a:font script="Tibt" typeface="Microsoft Himalaya"/>
+        <a:font script="Thaa" typeface="MV Boli"/>
+        <a:font script="Deva" typeface="Mangal"/>
+        <a:font script="Telu" typeface="Gautami"/>
+        <a:font script="Taml" typeface="Latha"/>
+        <a:font script="Syrc" typeface="Estrangelo Edessa"/>
+        <a:font script="Orya" typeface="Kalinga"/>
+        <a:font script="Mlym" typeface="Kartika"/>
+        <a:font script="Laoo" typeface="DokChampa"/>
+        <a:font script="Sinh" typeface="Iskoola Pota"/>
+        <a:font script="Mong" typeface="Mongolian Baiti"/>
+        <a:font script="Viet" typeface="Times New Roman"/>
+        <a:font script="Uigh" typeface="Microsoft Uighur"/>
+        <a:font script="Geor" typeface="Sylfaen"/>
+        <a:font script="Armn" typeface="Arial"/>
+        <a:font script="Bugi" typeface="Leelawadee UI"/>
+        <a:font script="Bopo" typeface="Microsoft JhengHei"/>
+        <a:font script="Java" typeface="Javanese Text"/>
+        <a:font script="Lisu" typeface="Segoe UI"/>
+        <a:font script="Mymr" typeface="Myanmar Text"/>
+        <a:font script="Nkoo" typeface="Ebrima"/>
+        <a:font script="Olck" typeface="Nirmala UI"/>
+        <a:font script="Osma" typeface="Ebrima"/>
+        <a:font script="Phag" typeface="Phagspa"/>
+        <a:font script="Syrn" typeface="Estrangelo Edessa"/>
+        <a:font script="Syrj" typeface="Estrangelo Edessa"/>
+        <a:font script="Syre" typeface="Estrangelo Edessa"/>
+        <a:font script="Sora" typeface="Nirmala UI"/>
+        <a:font script="Tale" typeface="Microsoft Tai Le"/>
+        <a:font script="Talu" typeface="Microsoft New Tai Lue"/>
+        <a:font script="Tfng" typeface="Ebrima"/>
+      </a:majorFont>
+      <a:minorFont>
+        <a:latin typeface="Calibri" panose="020F0502020204030204"/>
+        <a:ea typeface=""/>
+        <a:cs typeface=""/>
+        <a:font script="Jpan" typeface="游ゴシック"/>
+        <a:font script="Hang" typeface="맑은 고딕"/>
+        <a:font script="Hans" typeface="等线"/>
+        <a:font script="Hant" typeface="新細明體"/>
+        <a:font script="Arab" typeface="Arial"/>
+        <a:font script="Hebr" typeface="Arial"/>
+        <a:font script="Thai" typeface="Cordia New"/>
+        <a:font script="Ethi" typeface="Nyala"/>
+        <a:font script="Beng" typeface="Vrinda"/>
+        <a:font script="Gujr" typeface="Shruti"/>
+        <a:font script="Khmr" typeface="DaunPenh"/>
+        <a:font script="Knda" typeface="Tunga"/>
+        <a:font script="Guru" typeface="Raavi"/>
+        <a:font script="Cans" typeface="Euphemia"/>
+        <a:font script="Cher" typeface="Plantagenet Cherokee"/>
+        <a:font script="Yiii" typeface="Microsoft Yi Baiti"/>
+        <a:font script="Tibt" typeface="Microsoft Himalaya"/>
+        <a:font script="Thaa" typeface="MV Boli"/>
+        <a:font script="Deva" typeface="Mangal"/>
+        <a:font script="Telu" typeface="Gautami"/>
+        <a:font script="Taml" typeface="Latha"/>
+        <a:font script="Syrc" typeface="Estrangelo Edessa"/>
+        <a:font script="Orya" typeface="Kalinga"/>
+        <a:font script="Mlym" typeface="Kartika"/>
+        <a:font script="Laoo" typeface="DokChampa"/>
+        <a:font script="Sinh" typeface="Iskoola Pota"/>
+        <a:font script="Mong" typeface="Mongolian Baiti"/>
+        <a:font script="Viet" typeface="Arial"/>
+        <a:font script="Uigh" typeface="Microsoft Uighur"/>
+        <a:font script="Geor" typeface="Sylfaen"/>
+        <a:font script="Armn" typeface="Arial"/>
+        <a:font script="Bugi" typeface="Leelawadee UI"/>
+        <a:font script="Bopo" typeface="Microsoft JhengHei"/>
+        <a:font script="Java" typeface="Javanese Text"/>
+        <a:font script="Lisu" typeface="Segoe UI"/>
+        <a:font script="Mymr" typeface="Myanmar Text"/>
+        <a:font script="Nkoo" typeface="Ebrima"/>
+        <a:font script="Olck" typeface="Nirmala UI"/>
+        <a:font script="Osma" typeface="Ebrima"/>
+        <a:font script="Phag" typeface="Phagspa"/>
+        <a:font script="Syrn" typeface="Estrangelo Edessa"/>
+        <a:font script="Syrj" typeface="Estrangelo Edessa"/>
+        <a:font script="Syre" typeface="Estrangelo Edessa"/>
+        <a:font script="Sora" typeface="Nirmala UI"/>
+        <a:font script="Tale" typeface="Microsoft Tai Le"/>
+        <a:font script="Talu" typeface="Microsoft New Tai Lue"/>
+        <a:font script="Tfng" typeface="Ebrima"/>
+      </a:minorFont>
+    </a:fontScheme>
+    <a:fmtScheme name="Office">
+      <a:fillStyleLst>
+        <a:solidFill>
+          <a:schemeClr val="phClr"/>
+        </a:solidFill>
+        <a:gradFill rotWithShape="1">
+          <a:gsLst>
+            <a:gs pos="0">
+              <a:schemeClr val="phClr">
+                <a:lumMod val="110000"/>
+                <a:satMod val="105000"/>
+                <a:tint val="67000"/>
+              </a:schemeClr>
+            </a:gs>
+            <a:gs pos="50000">
+              <a:schemeClr val="phClr">
+                <a:lumMod val="105000"/>
+                <a:satMod val="103000"/>
+                <a:tint val="73000"/>
+              </a:schemeClr>
+            </a:gs>
+            <a:gs pos="100000">
+              <a:schemeClr val="phClr">
+                <a:lumMod val="105000"/>
+                <a:satMod val="109000"/>
+                <a:tint val="81000"/>
+              </a:schemeClr>
+            </a:gs>
+          </a:gsLst>
+          <a:lin ang="5400000" scaled="0"/>
+        </a:gradFill>
+        <a:gradFill rotWithShape="1">
+          <a:gsLst>
+            <a:gs pos="0">
+              <a:schemeClr val="phClr">
+                <a:satMod val="103000"/>
+                <a:lumMod val="102000"/>
+                <a:tint val="94000"/>
+              </a:schemeClr>
+            </a:gs>
+            <a:gs pos="50000">
+              <a:schemeClr val="phClr">
+                <a:satMod val="110000"/>
+                <a:lumMod val="100000"/>
+                <a:shade val="100000"/>
+              </a:schemeClr>
+            </a:gs>
+            <a:gs pos="100000">
+              <a:schemeClr val="phClr">
+                <a:lumMod val="99000"/>
+                <a:satMod val="120000"/>
+                <a:shade val="78000"/>
+              </a:schemeClr>
+            </a:gs>
+          </a:gsLst>
+          <a:lin ang="5400000" scaled="0"/>
+        </a:gradFill>
+      </a:fillStyleLst>
+      <a:lnStyleLst>
+        <a:ln w="6350" cap="flat" cmpd="sng" algn="ctr">
+          <a:solidFill>
+            <a:schemeClr val="phClr"/>
+          </a:solidFill>
+          <a:prstDash val="solid"/>
+          <a:miter lim="800000"/>
+        </a:ln>
+        <a:ln w="12700" cap="flat" cmpd="sng" algn="ctr">
+          <a:solidFill>
+            <a:schemeClr val="phClr"/>
+          </a:solidFill>
+          <a:prstDash val="solid"/>
+          <a:miter lim="800000"/>
+        </a:ln>
+        <a:ln w="19050" cap="flat" cmpd="sng" algn="ctr">
+          <a:solidFill>
+            <a:schemeClr val="phClr"/>
+          </a:solidFill>
+          <a:prstDash val="solid"/>
+          <a:miter lim="800000"/>
+        </a:ln>
+      </a:lnStyleLst>
+      <a:effectStyleLst>
+        <a:effectStyle>
+          <a:effectLst/>
+        </a:effectStyle>
+        <a:effectStyle>
+          <a:effectLst/>
+        </a:effectStyle>
+        <a:effectStyle>
+          <a:effectLst>
+            <a:outerShdw blurRad="57150" dist="19050" dir="5400000" algn="ctr" rotWithShape="0">
+              <a:srgbClr val="000000">
+                <a:alpha val="63000"/>
+              </a:srgbClr>
+            </a:outerShdw>
+          </a:effectLst>
+        </a:effectStyle>
+      </a:effectStyleLst>
+      <a:bgFillStyleLst>
+        <a:solidFill>
+          <a:schemeClr val="phClr"/>
+        </a:solidFill>
+        <a:solidFill>
+          <a:schemeClr val="phClr">
+            <a:tint val="95000"/>
+            <a:satMod val="170000"/>
+          </a:schemeClr>
+        </a:solidFill>
+        <a:gradFill rotWithShape="1">
+          <a:gsLst>
+            <a:gs pos="0">
+              <a:schemeClr val="phClr">
+                <a:tint val="93000"/>
+                <a:satMod val="150000"/>
+                <a:shade val="98000"/>
+                <a:lumMod val="102000"/>
+              </a:schemeClr>
+            </a:gs>
+            <a:gs pos="50000">
+              <a:schemeClr val="phClr">
+                <a:tint val="98000"/>
+                <a:satMod val="130000"/>
+                <a:shade val="90000"/>
+                <a:lumMod val="103000"/>
+              </a:schemeClr>
+            </a:gs>
+            <a:gs pos="100000">
+              <a:schemeClr val="phClr">
+                <a:shade val="63000"/>
+                <a:satMod val="120000"/>
+              </a:schemeClr>
+            </a:gs>
+          </a:gsLst>
+          <a:lin ang="5400000" scaled="0"/>
+        </a:gradFill>
+      </a:bgFillStyleLst>
+    </a:fmtScheme>
+  </a:themeElements>
+  <a:objectDefaults/>
+  <a:extraClrSchemeLst/>
+  <a:extLst>
+    <a:ext uri="{05A4C25C-085E-4340-85A3-A5531E510DB2}">
+      <thm15:themeFamily xmlns:thm15="http://schemas.microsoft.com/office/thememl/2012/main" name="Office Theme" id="{62F939B6-93AF-4DB8-9C6B-D6C7DFDC589F}" vid="{4A3C46E8-61CC-4603-A589-7422A47A8E4A}"/>
+    </a:ext>
+  </a:extLst>
+</a:theme>
 </file>
</xml_diff>